<commit_message>
updated JAR exe and Powerpoint presentation
</commit_message>
<xml_diff>
--- a/assigns/assign10/t1-a10.pptx
+++ b/assigns/assign10/t1-a10.pptx
@@ -5,20 +5,25 @@
     <p:sldMasterId id="2147483672" r:id="rId2"/>
   </p:sldMasterIdLst>
   <p:notesMasterIdLst>
-    <p:notesMasterId r:id="rId11"/>
+    <p:notesMasterId r:id="rId16"/>
   </p:notesMasterIdLst>
   <p:handoutMasterIdLst>
-    <p:handoutMasterId r:id="rId12"/>
+    <p:handoutMasterId r:id="rId17"/>
   </p:handoutMasterIdLst>
   <p:sldIdLst>
     <p:sldId id="256" r:id="rId3"/>
     <p:sldId id="257" r:id="rId4"/>
     <p:sldId id="258" r:id="rId5"/>
-    <p:sldId id="274" r:id="rId6"/>
-    <p:sldId id="278" r:id="rId7"/>
-    <p:sldId id="275" r:id="rId8"/>
-    <p:sldId id="276" r:id="rId9"/>
-    <p:sldId id="277" r:id="rId10"/>
+    <p:sldId id="279" r:id="rId6"/>
+    <p:sldId id="280" r:id="rId7"/>
+    <p:sldId id="274" r:id="rId8"/>
+    <p:sldId id="278" r:id="rId9"/>
+    <p:sldId id="281" r:id="rId10"/>
+    <p:sldId id="282" r:id="rId11"/>
+    <p:sldId id="283" r:id="rId12"/>
+    <p:sldId id="284" r:id="rId13"/>
+    <p:sldId id="275" r:id="rId14"/>
+    <p:sldId id="276" r:id="rId15"/>
   </p:sldIdLst>
   <p:sldSz cx="12192000" cy="6858000"/>
   <p:notesSz cx="6858000" cy="9144000"/>
@@ -236,7 +241,7 @@
           <a:p>
             <a:fld id="{85B84C55-34AB-4F04-8C6E-103378987567}" type="datetimeFigureOut">
               <a:rPr lang="en-US" smtClean="0"/>
-              <a:t>6/4/2015</a:t>
+              <a:t>6/6/2015</a:t>
             </a:fld>
             <a:endParaRPr lang="en-US" dirty="0"/>
           </a:p>
@@ -401,7 +406,7 @@
           <a:p>
             <a:fld id="{86832DD9-7C6A-4C91-8CF1-0788B8213502}" type="datetimeFigureOut">
               <a:rPr lang="en-US" smtClean="0"/>
-              <a:t>6/4/2015</a:t>
+              <a:t>6/6/2015</a:t>
             </a:fld>
             <a:endParaRPr lang="en-US" dirty="0"/>
           </a:p>
@@ -787,7 +792,7 @@
           <a:p>
             <a:fld id="{8A57DA2E-A198-42B8-A77A-6063A9DC8646}" type="datetime1">
               <a:rPr lang="en-US" smtClean="0"/>
-              <a:t>6/4/2015</a:t>
+              <a:t>6/6/2015</a:t>
             </a:fld>
             <a:endParaRPr lang="en-US" dirty="0"/>
           </a:p>
@@ -1202,7 +1207,7 @@
           <a:p>
             <a:fld id="{5D0B467C-85F7-469C-B16D-CF41F04F5F22}" type="datetime1">
               <a:rPr lang="en-US" smtClean="0"/>
-              <a:t>6/4/2015</a:t>
+              <a:t>6/6/2015</a:t>
             </a:fld>
             <a:endParaRPr lang="en-US" dirty="0"/>
           </a:p>
@@ -1384,7 +1389,7 @@
           <a:p>
             <a:fld id="{38E79436-BD82-44D9-9B6F-6D45FC4FB282}" type="datetime1">
               <a:rPr lang="en-US" smtClean="0"/>
-              <a:t>6/4/2015</a:t>
+              <a:t>6/6/2015</a:t>
             </a:fld>
             <a:endParaRPr lang="en-US" dirty="0"/>
           </a:p>
@@ -1576,7 +1581,7 @@
           <a:p>
             <a:fld id="{6955B0D3-E9C4-4790-9AFC-472238E9D978}" type="datetime1">
               <a:rPr lang="en-US" smtClean="0"/>
-              <a:t>6/4/2015</a:t>
+              <a:t>6/6/2015</a:t>
             </a:fld>
             <a:endParaRPr lang="en-US" dirty="0"/>
           </a:p>
@@ -1762,7 +1767,7 @@
           <a:p>
             <a:fld id="{A9EFB39F-05CF-4198-9763-0EA4BE92E0D0}" type="datetime1">
               <a:rPr lang="en-US" smtClean="0"/>
-              <a:t>6/4/2015</a:t>
+              <a:t>6/6/2015</a:t>
             </a:fld>
             <a:endParaRPr lang="en-US" dirty="0"/>
           </a:p>
@@ -1999,7 +2004,7 @@
           <a:p>
             <a:fld id="{FF2491D0-1B86-4F30-8D90-913BBBB0A4F2}" type="datetime1">
               <a:rPr lang="en-US" smtClean="0"/>
-              <a:t>6/4/2015</a:t>
+              <a:t>6/6/2015</a:t>
             </a:fld>
             <a:endParaRPr lang="en-US" dirty="0"/>
           </a:p>
@@ -2280,7 +2285,7 @@
           <a:p>
             <a:fld id="{A28FD5D4-22BE-49CA-89DE-DEB7778B4EA0}" type="datetime1">
               <a:rPr lang="en-US" smtClean="0"/>
-              <a:t>6/4/2015</a:t>
+              <a:t>6/6/2015</a:t>
             </a:fld>
             <a:endParaRPr lang="en-US" dirty="0"/>
           </a:p>
@@ -2671,7 +2676,7 @@
           <a:p>
             <a:fld id="{98A942CB-856E-4E4B-8C89-197AEAE66A5F}" type="datetime1">
               <a:rPr lang="en-US" smtClean="0"/>
-              <a:t>6/4/2015</a:t>
+              <a:t>6/6/2015</a:t>
             </a:fld>
             <a:endParaRPr lang="en-US" dirty="0"/>
           </a:p>
@@ -2810,7 +2815,7 @@
           <a:p>
             <a:fld id="{90C5A565-20AE-4CD1-A4DD-E062216372E9}" type="datetime1">
               <a:rPr lang="en-US" smtClean="0"/>
-              <a:t>6/4/2015</a:t>
+              <a:t>6/6/2015</a:t>
             </a:fld>
             <a:endParaRPr lang="en-US" dirty="0"/>
           </a:p>
@@ -2990,7 +2995,7 @@
           <a:p>
             <a:fld id="{43669077-B497-459B-927D-21898BE78E1B}" type="datetime1">
               <a:rPr lang="en-US" smtClean="0"/>
-              <a:t>6/4/2015</a:t>
+              <a:t>6/6/2015</a:t>
             </a:fld>
             <a:endParaRPr lang="en-US" dirty="0"/>
           </a:p>
@@ -3261,7 +3266,7 @@
           <a:p>
             <a:fld id="{E5371151-446F-4595-B3D3-21EF3A6E9BFE}" type="datetime1">
               <a:rPr lang="en-US" smtClean="0"/>
-              <a:t>6/4/2015</a:t>
+              <a:t>6/6/2015</a:t>
             </a:fld>
             <a:endParaRPr lang="en-US" dirty="0"/>
           </a:p>
@@ -3576,7 +3581,7 @@
           <a:p>
             <a:fld id="{671E04DB-BE65-47F8-B877-7DBE6DFA71B8}" type="datetime1">
               <a:rPr lang="en-US" smtClean="0"/>
-              <a:t>6/4/2015</a:t>
+              <a:t>6/6/2015</a:t>
             </a:fld>
             <a:endParaRPr lang="en-US" dirty="0"/>
           </a:p>
@@ -4283,6 +4288,523 @@
 </p:sld>
 </file>
 
+<file path=ppt/slides/slide10.xml><?xml version="1.0" encoding="utf-8"?>
+<p:sld xmlns:a="http://schemas.openxmlformats.org/drawingml/2006/main" xmlns:r="http://schemas.openxmlformats.org/officeDocument/2006/relationships" xmlns:p="http://schemas.openxmlformats.org/presentationml/2006/main">
+  <p:cSld>
+    <p:spTree>
+      <p:nvGrpSpPr>
+        <p:cNvPr id="1" name=""/>
+        <p:cNvGrpSpPr/>
+        <p:nvPr/>
+      </p:nvGrpSpPr>
+      <p:grpSpPr>
+        <a:xfrm>
+          <a:off x="0" y="0"/>
+          <a:ext cx="0" cy="0"/>
+          <a:chOff x="0" y="0"/>
+          <a:chExt cx="0" cy="0"/>
+        </a:xfrm>
+      </p:grpSpPr>
+      <p:sp>
+        <p:nvSpPr>
+          <p:cNvPr id="3" name="Content Placeholder 2"/>
+          <p:cNvSpPr>
+            <a:spLocks noGrp="1"/>
+          </p:cNvSpPr>
+          <p:nvPr>
+            <p:ph idx="1"/>
+          </p:nvPr>
+        </p:nvSpPr>
+        <p:spPr/>
+        <p:txBody>
+          <a:bodyPr/>
+          <a:lstStyle/>
+          <a:p>
+            <a:endParaRPr lang="en-US" dirty="0" smtClean="0"/>
+          </a:p>
+          <a:p>
+            <a:endParaRPr lang="en-US" dirty="0"/>
+          </a:p>
+        </p:txBody>
+      </p:sp>
+      <p:sp>
+        <p:nvSpPr>
+          <p:cNvPr id="2" name="Title 1"/>
+          <p:cNvSpPr>
+            <a:spLocks noGrp="1"/>
+          </p:cNvSpPr>
+          <p:nvPr>
+            <p:ph type="title"/>
+          </p:nvPr>
+        </p:nvSpPr>
+        <p:spPr/>
+        <p:txBody>
+          <a:bodyPr/>
+          <a:lstStyle/>
+          <a:p>
+            <a:r>
+              <a:rPr lang="en-US" dirty="0" smtClean="0"/>
+              <a:t>Overview – Test Results Reporting</a:t>
+            </a:r>
+            <a:endParaRPr lang="en-US" dirty="0"/>
+          </a:p>
+        </p:txBody>
+      </p:sp>
+    </p:spTree>
+    <p:extLst>
+      <p:ext uri="{BB962C8B-B14F-4D97-AF65-F5344CB8AC3E}">
+        <p14:creationId xmlns:p14="http://schemas.microsoft.com/office/powerpoint/2010/main" val="3330300547"/>
+      </p:ext>
+    </p:extLst>
+  </p:cSld>
+  <p:clrMapOvr>
+    <a:masterClrMapping/>
+  </p:clrMapOvr>
+  <mc:AlternateContent xmlns:mc="http://schemas.openxmlformats.org/markup-compatibility/2006" xmlns:p14="http://schemas.microsoft.com/office/powerpoint/2010/main">
+    <mc:Choice Requires="p14">
+      <p:transition spd="med" p14:dur="700">
+        <p:fade/>
+      </p:transition>
+    </mc:Choice>
+    <mc:Fallback xmlns="">
+      <p:transition spd="med">
+        <p:fade/>
+      </p:transition>
+    </mc:Fallback>
+  </mc:AlternateContent>
+  <p:timing>
+    <p:tnLst>
+      <p:par>
+        <p:cTn id="1" dur="indefinite" restart="never" nodeType="tmRoot"/>
+      </p:par>
+    </p:tnLst>
+  </p:timing>
+</p:sld>
+</file>
+
+<file path=ppt/slides/slide11.xml><?xml version="1.0" encoding="utf-8"?>
+<p:sld xmlns:a="http://schemas.openxmlformats.org/drawingml/2006/main" xmlns:r="http://schemas.openxmlformats.org/officeDocument/2006/relationships" xmlns:p="http://schemas.openxmlformats.org/presentationml/2006/main">
+  <p:cSld>
+    <p:spTree>
+      <p:nvGrpSpPr>
+        <p:cNvPr id="1" name=""/>
+        <p:cNvGrpSpPr/>
+        <p:nvPr/>
+      </p:nvGrpSpPr>
+      <p:grpSpPr>
+        <a:xfrm>
+          <a:off x="0" y="0"/>
+          <a:ext cx="0" cy="0"/>
+          <a:chOff x="0" y="0"/>
+          <a:chExt cx="0" cy="0"/>
+        </a:xfrm>
+      </p:grpSpPr>
+      <p:sp>
+        <p:nvSpPr>
+          <p:cNvPr id="3" name="Content Placeholder 2"/>
+          <p:cNvSpPr>
+            <a:spLocks noGrp="1"/>
+          </p:cNvSpPr>
+          <p:nvPr>
+            <p:ph idx="1"/>
+          </p:nvPr>
+        </p:nvSpPr>
+        <p:spPr/>
+        <p:txBody>
+          <a:bodyPr/>
+          <a:lstStyle/>
+          <a:p>
+            <a:pPr lvl="1"/>
+            <a:endParaRPr lang="en-US" dirty="0" smtClean="0"/>
+          </a:p>
+          <a:p>
+            <a:endParaRPr lang="en-US" dirty="0"/>
+          </a:p>
+        </p:txBody>
+      </p:sp>
+      <p:sp>
+        <p:nvSpPr>
+          <p:cNvPr id="2" name="Title 1"/>
+          <p:cNvSpPr>
+            <a:spLocks noGrp="1"/>
+          </p:cNvSpPr>
+          <p:nvPr>
+            <p:ph type="title"/>
+          </p:nvPr>
+        </p:nvSpPr>
+        <p:spPr/>
+        <p:txBody>
+          <a:bodyPr/>
+          <a:lstStyle/>
+          <a:p>
+            <a:r>
+              <a:rPr lang="en-US" dirty="0" smtClean="0"/>
+              <a:t>Overview – Test Results Reporting</a:t>
+            </a:r>
+            <a:endParaRPr lang="en-US" dirty="0"/>
+          </a:p>
+        </p:txBody>
+      </p:sp>
+      <p:pic>
+        <p:nvPicPr>
+          <p:cNvPr id="8" name="Picture 7"/>
+          <p:cNvPicPr>
+            <a:picLocks noChangeAspect="1"/>
+          </p:cNvPicPr>
+          <p:nvPr/>
+        </p:nvPicPr>
+        <p:blipFill>
+          <a:blip r:embed="rId2"/>
+          <a:stretch>
+            <a:fillRect/>
+          </a:stretch>
+        </p:blipFill>
+        <p:spPr>
+          <a:xfrm>
+            <a:off x="147109" y="1910557"/>
+            <a:ext cx="3905250" cy="3905250"/>
+          </a:xfrm>
+          <a:prstGeom prst="rect">
+            <a:avLst/>
+          </a:prstGeom>
+        </p:spPr>
+      </p:pic>
+      <p:pic>
+        <p:nvPicPr>
+          <p:cNvPr id="10" name="Picture 9"/>
+          <p:cNvPicPr>
+            <a:picLocks noChangeAspect="1"/>
+          </p:cNvPicPr>
+          <p:nvPr/>
+        </p:nvPicPr>
+        <p:blipFill>
+          <a:blip r:embed="rId3"/>
+          <a:stretch>
+            <a:fillRect/>
+          </a:stretch>
+        </p:blipFill>
+        <p:spPr>
+          <a:xfrm>
+            <a:off x="4131733" y="1910557"/>
+            <a:ext cx="3905250" cy="3905250"/>
+          </a:xfrm>
+          <a:prstGeom prst="rect">
+            <a:avLst/>
+          </a:prstGeom>
+        </p:spPr>
+      </p:pic>
+      <p:pic>
+        <p:nvPicPr>
+          <p:cNvPr id="11" name="Picture 10"/>
+          <p:cNvPicPr>
+            <a:picLocks noChangeAspect="1"/>
+          </p:cNvPicPr>
+          <p:nvPr/>
+        </p:nvPicPr>
+        <p:blipFill>
+          <a:blip r:embed="rId4"/>
+          <a:stretch>
+            <a:fillRect/>
+          </a:stretch>
+        </p:blipFill>
+        <p:spPr>
+          <a:xfrm>
+            <a:off x="8116358" y="1910557"/>
+            <a:ext cx="3905250" cy="3905250"/>
+          </a:xfrm>
+          <a:prstGeom prst="rect">
+            <a:avLst/>
+          </a:prstGeom>
+        </p:spPr>
+      </p:pic>
+    </p:spTree>
+    <p:extLst>
+      <p:ext uri="{BB962C8B-B14F-4D97-AF65-F5344CB8AC3E}">
+        <p14:creationId xmlns:p14="http://schemas.microsoft.com/office/powerpoint/2010/main" val="2533236408"/>
+      </p:ext>
+    </p:extLst>
+  </p:cSld>
+  <p:clrMapOvr>
+    <a:masterClrMapping/>
+  </p:clrMapOvr>
+  <mc:AlternateContent xmlns:mc="http://schemas.openxmlformats.org/markup-compatibility/2006" xmlns:p14="http://schemas.microsoft.com/office/powerpoint/2010/main">
+    <mc:Choice Requires="p14">
+      <p:transition spd="med" p14:dur="700">
+        <p:fade/>
+      </p:transition>
+    </mc:Choice>
+    <mc:Fallback xmlns="">
+      <p:transition spd="med">
+        <p:fade/>
+      </p:transition>
+    </mc:Fallback>
+  </mc:AlternateContent>
+  <p:timing>
+    <p:tnLst>
+      <p:par>
+        <p:cTn id="1" dur="indefinite" restart="never" nodeType="tmRoot"/>
+      </p:par>
+    </p:tnLst>
+  </p:timing>
+</p:sld>
+</file>
+
+<file path=ppt/slides/slide12.xml><?xml version="1.0" encoding="utf-8"?>
+<p:sld xmlns:a="http://schemas.openxmlformats.org/drawingml/2006/main" xmlns:r="http://schemas.openxmlformats.org/officeDocument/2006/relationships" xmlns:p="http://schemas.openxmlformats.org/presentationml/2006/main">
+  <p:cSld>
+    <p:spTree>
+      <p:nvGrpSpPr>
+        <p:cNvPr id="1" name=""/>
+        <p:cNvGrpSpPr/>
+        <p:nvPr/>
+      </p:nvGrpSpPr>
+      <p:grpSpPr>
+        <a:xfrm>
+          <a:off x="0" y="0"/>
+          <a:ext cx="0" cy="0"/>
+          <a:chOff x="0" y="0"/>
+          <a:chExt cx="0" cy="0"/>
+        </a:xfrm>
+      </p:grpSpPr>
+      <p:sp>
+        <p:nvSpPr>
+          <p:cNvPr id="3" name="Content Placeholder 2"/>
+          <p:cNvSpPr>
+            <a:spLocks noGrp="1"/>
+          </p:cNvSpPr>
+          <p:nvPr>
+            <p:ph idx="1"/>
+          </p:nvPr>
+        </p:nvSpPr>
+        <p:spPr/>
+        <p:txBody>
+          <a:bodyPr/>
+          <a:lstStyle/>
+          <a:p>
+            <a:r>
+              <a:rPr lang="en-US" dirty="0" smtClean="0"/>
+              <a:t>Get familiar with the Eclipse IDE</a:t>
+            </a:r>
+          </a:p>
+          <a:p>
+            <a:r>
+              <a:rPr lang="en-US" dirty="0" smtClean="0"/>
+              <a:t>Design the database</a:t>
+            </a:r>
+          </a:p>
+          <a:p>
+            <a:r>
+              <a:rPr lang="en-US" dirty="0" smtClean="0"/>
+              <a:t>Setup the class models</a:t>
+            </a:r>
+          </a:p>
+          <a:p>
+            <a:r>
+              <a:rPr lang="en-US" dirty="0" smtClean="0"/>
+              <a:t>Get familiar with the MVC design pattern</a:t>
+            </a:r>
+          </a:p>
+          <a:p>
+            <a:r>
+              <a:rPr lang="en-US" dirty="0" smtClean="0"/>
+              <a:t>Divide up the stories in the sprint</a:t>
+            </a:r>
+          </a:p>
+          <a:p>
+            <a:r>
+              <a:rPr lang="en-US" dirty="0" smtClean="0"/>
+              <a:t>Start coding</a:t>
+            </a:r>
+            <a:endParaRPr lang="en-US" dirty="0" smtClean="0"/>
+          </a:p>
+          <a:p>
+            <a:endParaRPr lang="en-US" dirty="0" smtClean="0"/>
+          </a:p>
+          <a:p>
+            <a:endParaRPr lang="en-US" dirty="0" smtClean="0"/>
+          </a:p>
+          <a:p>
+            <a:endParaRPr lang="en-US" dirty="0"/>
+          </a:p>
+        </p:txBody>
+      </p:sp>
+      <p:sp>
+        <p:nvSpPr>
+          <p:cNvPr id="2" name="Title 1"/>
+          <p:cNvSpPr>
+            <a:spLocks noGrp="1"/>
+          </p:cNvSpPr>
+          <p:nvPr>
+            <p:ph type="title"/>
+          </p:nvPr>
+        </p:nvSpPr>
+        <p:spPr/>
+        <p:txBody>
+          <a:bodyPr/>
+          <a:lstStyle/>
+          <a:p>
+            <a:r>
+              <a:rPr lang="en-US" dirty="0" smtClean="0"/>
+              <a:t>Approach</a:t>
+            </a:r>
+            <a:endParaRPr lang="en-US" dirty="0"/>
+          </a:p>
+        </p:txBody>
+      </p:sp>
+    </p:spTree>
+    <p:extLst>
+      <p:ext uri="{BB962C8B-B14F-4D97-AF65-F5344CB8AC3E}">
+        <p14:creationId xmlns:p14="http://schemas.microsoft.com/office/powerpoint/2010/main" val="2933535503"/>
+      </p:ext>
+    </p:extLst>
+  </p:cSld>
+  <p:clrMapOvr>
+    <a:masterClrMapping/>
+  </p:clrMapOvr>
+  <mc:AlternateContent xmlns:mc="http://schemas.openxmlformats.org/markup-compatibility/2006" xmlns:p14="http://schemas.microsoft.com/office/powerpoint/2010/main">
+    <mc:Choice Requires="p14">
+      <p:transition spd="med" p14:dur="700">
+        <p:fade/>
+      </p:transition>
+    </mc:Choice>
+    <mc:Fallback xmlns="">
+      <p:transition spd="med">
+        <p:fade/>
+      </p:transition>
+    </mc:Fallback>
+  </mc:AlternateContent>
+  <p:timing>
+    <p:tnLst>
+      <p:par>
+        <p:cTn id="1" dur="indefinite" restart="never" nodeType="tmRoot"/>
+      </p:par>
+    </p:tnLst>
+  </p:timing>
+</p:sld>
+</file>
+
+<file path=ppt/slides/slide13.xml><?xml version="1.0" encoding="utf-8"?>
+<p:sld xmlns:a="http://schemas.openxmlformats.org/drawingml/2006/main" xmlns:r="http://schemas.openxmlformats.org/officeDocument/2006/relationships" xmlns:p="http://schemas.openxmlformats.org/presentationml/2006/main">
+  <p:cSld>
+    <p:spTree>
+      <p:nvGrpSpPr>
+        <p:cNvPr id="1" name=""/>
+        <p:cNvGrpSpPr/>
+        <p:nvPr/>
+      </p:nvGrpSpPr>
+      <p:grpSpPr>
+        <a:xfrm>
+          <a:off x="0" y="0"/>
+          <a:ext cx="0" cy="0"/>
+          <a:chOff x="0" y="0"/>
+          <a:chExt cx="0" cy="0"/>
+        </a:xfrm>
+      </p:grpSpPr>
+      <p:sp>
+        <p:nvSpPr>
+          <p:cNvPr id="3" name="Content Placeholder 2"/>
+          <p:cNvSpPr>
+            <a:spLocks noGrp="1"/>
+          </p:cNvSpPr>
+          <p:nvPr>
+            <p:ph idx="1"/>
+          </p:nvPr>
+        </p:nvSpPr>
+        <p:spPr/>
+        <p:txBody>
+          <a:bodyPr/>
+          <a:lstStyle/>
+          <a:p>
+            <a:r>
+              <a:rPr lang="en-US" dirty="0" smtClean="0"/>
+              <a:t>Constant Check-ins</a:t>
+            </a:r>
+          </a:p>
+          <a:p>
+            <a:r>
+              <a:rPr lang="en-US" dirty="0" smtClean="0"/>
+              <a:t>GitHub – Revision Control</a:t>
+            </a:r>
+          </a:p>
+          <a:p>
+            <a:r>
+              <a:rPr lang="en-US" dirty="0" smtClean="0"/>
+              <a:t>Proper MVC coding</a:t>
+            </a:r>
+          </a:p>
+          <a:p>
+            <a:r>
+              <a:rPr lang="en-US" dirty="0" smtClean="0"/>
+              <a:t>Eclipse IDE</a:t>
+            </a:r>
+          </a:p>
+          <a:p>
+            <a:r>
+              <a:rPr lang="en-US" dirty="0" smtClean="0"/>
+              <a:t>Assumptions</a:t>
+            </a:r>
+            <a:endParaRPr lang="en-US" dirty="0" smtClean="0"/>
+          </a:p>
+          <a:p>
+            <a:endParaRPr lang="en-US" dirty="0"/>
+          </a:p>
+        </p:txBody>
+      </p:sp>
+      <p:sp>
+        <p:nvSpPr>
+          <p:cNvPr id="2" name="Title 1"/>
+          <p:cNvSpPr>
+            <a:spLocks noGrp="1"/>
+          </p:cNvSpPr>
+          <p:nvPr>
+            <p:ph type="title"/>
+          </p:nvPr>
+        </p:nvSpPr>
+        <p:spPr/>
+        <p:txBody>
+          <a:bodyPr/>
+          <a:lstStyle/>
+          <a:p>
+            <a:r>
+              <a:rPr lang="en-US" dirty="0" smtClean="0"/>
+              <a:t>Challenges / Lessons Learned</a:t>
+            </a:r>
+            <a:endParaRPr lang="en-US" dirty="0"/>
+          </a:p>
+        </p:txBody>
+      </p:sp>
+    </p:spTree>
+    <p:extLst>
+      <p:ext uri="{BB962C8B-B14F-4D97-AF65-F5344CB8AC3E}">
+        <p14:creationId xmlns:p14="http://schemas.microsoft.com/office/powerpoint/2010/main" val="588025368"/>
+      </p:ext>
+    </p:extLst>
+  </p:cSld>
+  <p:clrMapOvr>
+    <a:masterClrMapping/>
+  </p:clrMapOvr>
+  <mc:AlternateContent xmlns:mc="http://schemas.openxmlformats.org/markup-compatibility/2006" xmlns:p14="http://schemas.microsoft.com/office/powerpoint/2010/main">
+    <mc:Choice Requires="p14">
+      <p:transition spd="med" p14:dur="700">
+        <p:fade/>
+      </p:transition>
+    </mc:Choice>
+    <mc:Fallback xmlns="">
+      <p:transition spd="med">
+        <p:fade/>
+      </p:transition>
+    </mc:Fallback>
+  </mc:AlternateContent>
+  <p:timing>
+    <p:tnLst>
+      <p:par>
+        <p:cTn id="1" dur="indefinite" restart="never" nodeType="tmRoot"/>
+      </p:par>
+    </p:tnLst>
+  </p:timing>
+</p:sld>
+</file>
+
 <file path=ppt/slides/slide2.xml><?xml version="1.0" encoding="utf-8"?>
 <p:sld xmlns:a="http://schemas.openxmlformats.org/drawingml/2006/main" xmlns:r="http://schemas.openxmlformats.org/officeDocument/2006/relationships" xmlns:p="http://schemas.openxmlformats.org/presentationml/2006/main">
   <p:cSld>
@@ -4319,7 +4841,6 @@
               <a:rPr lang="en-US" dirty="0" smtClean="0"/>
               <a:t>Stories Completed</a:t>
             </a:r>
-            <a:endParaRPr lang="en-US" dirty="0" smtClean="0"/>
           </a:p>
           <a:p>
             <a:r>
@@ -4338,7 +4859,6 @@
               <a:rPr lang="en-US" dirty="0" smtClean="0"/>
               <a:t>Challenges / Lessons Learned</a:t>
             </a:r>
-            <a:endParaRPr lang="en-US" dirty="0" smtClean="0"/>
           </a:p>
           <a:p>
             <a:endParaRPr lang="en-US" dirty="0" smtClean="0"/>
@@ -4433,27 +4953,23 @@
           <a:lstStyle/>
           <a:p>
             <a:r>
-              <a:rPr lang="en-US" b="1" dirty="0"/>
-              <a:t>N-item Sort </a:t>
-            </a:r>
-            <a:endParaRPr lang="en-US" b="1" dirty="0" smtClean="0"/>
+              <a:rPr lang="en-US" b="1" dirty="0" smtClean="0"/>
+              <a:t>Foundation </a:t>
+            </a:r>
+            <a:r>
+              <a:rPr lang="en-US" b="1" dirty="0" smtClean="0"/>
+              <a:t>stories</a:t>
+            </a:r>
           </a:p>
           <a:p>
             <a:pPr lvl="1"/>
-            <a:r>
-              <a:rPr lang="en-US" b="1" dirty="0" smtClean="0"/>
-              <a:t>Foundation stories</a:t>
-            </a:r>
-          </a:p>
-          <a:p>
-            <a:pPr lvl="2"/>
             <a:r>
               <a:rPr lang="en-US" b="1" dirty="0" smtClean="0"/>
               <a:t>Admin Set-up</a:t>
             </a:r>
           </a:p>
           <a:p>
-            <a:pPr lvl="2"/>
+            <a:pPr lvl="1"/>
             <a:r>
               <a:rPr lang="en-US" b="1" dirty="0" smtClean="0"/>
               <a:t>User </a:t>
@@ -4465,14 +4981,17 @@
             <a:endParaRPr lang="en-US" b="1" dirty="0" smtClean="0"/>
           </a:p>
           <a:p>
+            <a:r>
+              <a:rPr lang="en-US" b="1" dirty="0" smtClean="0"/>
+              <a:t>Side </a:t>
+            </a:r>
+            <a:r>
+              <a:rPr lang="en-US" b="1" dirty="0" smtClean="0"/>
+              <a:t>Stories</a:t>
+            </a:r>
+          </a:p>
+          <a:p>
             <a:pPr lvl="1"/>
-            <a:r>
-              <a:rPr lang="en-US" b="1" dirty="0" smtClean="0"/>
-              <a:t>Elected Side Stories</a:t>
-            </a:r>
-          </a:p>
-          <a:p>
-            <a:pPr lvl="2"/>
             <a:r>
               <a:rPr lang="en-US" b="1" dirty="0"/>
               <a:t>Basic Result Reporting </a:t>
@@ -4480,21 +4999,21 @@
             <a:endParaRPr lang="en-US" b="1" dirty="0" smtClean="0"/>
           </a:p>
           <a:p>
-            <a:pPr lvl="2"/>
+            <a:pPr lvl="1"/>
             <a:r>
               <a:rPr lang="en-US" b="1" dirty="0" smtClean="0"/>
               <a:t>Progress Meter</a:t>
             </a:r>
           </a:p>
           <a:p>
-            <a:pPr lvl="2"/>
+            <a:pPr lvl="1"/>
             <a:r>
               <a:rPr lang="en-US" b="1" dirty="0" smtClean="0"/>
               <a:t>Custom Comparison with Images</a:t>
             </a:r>
           </a:p>
           <a:p>
-            <a:pPr lvl="2"/>
+            <a:pPr lvl="1"/>
             <a:r>
               <a:rPr lang="en-US" b="1" dirty="0" smtClean="0"/>
               <a:t>User Tracking</a:t>
@@ -4530,7 +5049,15 @@
           <a:p>
             <a:r>
               <a:rPr lang="en-US" dirty="0" smtClean="0"/>
-              <a:t>Stories Completed</a:t>
+              <a:t>Stories </a:t>
+            </a:r>
+            <a:r>
+              <a:rPr lang="en-US" dirty="0" smtClean="0"/>
+              <a:t>Completed – N-</a:t>
+            </a:r>
+            <a:r>
+              <a:rPr lang="en-US" dirty="0" err="1" smtClean="0"/>
+              <a:t>ItemSort</a:t>
             </a:r>
             <a:endParaRPr lang="en-US" dirty="0"/>
           </a:p>
@@ -4602,44 +5129,21 @@
           <a:p>
             <a:r>
               <a:rPr lang="en-US" dirty="0" smtClean="0"/>
-              <a:t>Admin Test Setup</a:t>
-            </a:r>
-          </a:p>
-          <a:p>
-            <a:pPr lvl="1"/>
+              <a:t>New user registration</a:t>
+            </a:r>
+          </a:p>
+          <a:p>
             <a:r>
               <a:rPr lang="en-US" dirty="0" smtClean="0"/>
-              <a:t>Add / Delete Existing Database Items (e.g. words or phrases)</a:t>
-            </a:r>
-          </a:p>
-          <a:p>
-            <a:pPr lvl="1"/>
+              <a:t>Login by username</a:t>
+            </a:r>
+            <a:endParaRPr lang="en-US" dirty="0" smtClean="0"/>
+          </a:p>
+          <a:p>
             <a:r>
               <a:rPr lang="en-US" dirty="0" smtClean="0"/>
-              <a:t>Add / Remove Test Items</a:t>
-            </a:r>
-          </a:p>
-          <a:p>
-            <a:pPr lvl="1"/>
-            <a:r>
-              <a:rPr lang="en-US" dirty="0" smtClean="0"/>
-              <a:t>Associate New or Existing Database Images to Existing Items</a:t>
-            </a:r>
-          </a:p>
-          <a:p>
-            <a:pPr lvl="1"/>
-            <a:r>
-              <a:rPr lang="en-US" dirty="0" smtClean="0"/>
-              <a:t>Display Progress Meter During the User Test</a:t>
-            </a:r>
-          </a:p>
-          <a:p>
-            <a:pPr lvl="1"/>
-            <a:r>
-              <a:rPr lang="en-US" dirty="0" smtClean="0"/>
-              <a:t>View Test Results</a:t>
-            </a:r>
-            <a:endParaRPr lang="en-US" dirty="0" smtClean="0"/>
+              <a:t>Username credentials determine access role</a:t>
+            </a:r>
           </a:p>
           <a:p>
             <a:pPr lvl="1"/>
@@ -4667,7 +5171,7 @@
           <a:p>
             <a:r>
               <a:rPr lang="en-US" dirty="0" smtClean="0"/>
-              <a:t>Overview</a:t>
+              <a:t>Overview - Login</a:t>
             </a:r>
             <a:endParaRPr lang="en-US" dirty="0"/>
           </a:p>
@@ -4676,7 +5180,7 @@
     </p:spTree>
     <p:extLst>
       <p:ext uri="{BB962C8B-B14F-4D97-AF65-F5344CB8AC3E}">
-        <p14:creationId xmlns:p14="http://schemas.microsoft.com/office/powerpoint/2010/main" val="344505319"/>
+        <p14:creationId xmlns:p14="http://schemas.microsoft.com/office/powerpoint/2010/main" val="2343073498"/>
       </p:ext>
     </p:extLst>
   </p:cSld>
@@ -4762,7 +5266,7 @@
           <a:p>
             <a:r>
               <a:rPr lang="en-US" dirty="0" smtClean="0"/>
-              <a:t>Overview</a:t>
+              <a:t>Overview – Login Screen</a:t>
             </a:r>
             <a:endParaRPr lang="en-US" dirty="0"/>
           </a:p>
@@ -4784,8 +5288,8 @@
         </p:blipFill>
         <p:spPr>
           <a:xfrm>
-            <a:off x="2878667" y="1154679"/>
-            <a:ext cx="7612978" cy="5381588"/>
+            <a:off x="2383366" y="2021946"/>
+            <a:ext cx="7153302" cy="3359152"/>
           </a:xfrm>
           <a:prstGeom prst="rect">
             <a:avLst/>
@@ -4795,7 +5299,7 @@
     </p:spTree>
     <p:extLst>
       <p:ext uri="{BB962C8B-B14F-4D97-AF65-F5344CB8AC3E}">
-        <p14:creationId xmlns:p14="http://schemas.microsoft.com/office/powerpoint/2010/main" val="1453078861"/>
+        <p14:creationId xmlns:p14="http://schemas.microsoft.com/office/powerpoint/2010/main" val="1833388435"/>
       </p:ext>
     </p:extLst>
   </p:cSld>
@@ -4856,6 +5360,53 @@
           <a:bodyPr/>
           <a:lstStyle/>
           <a:p>
+            <a:r>
+              <a:rPr lang="en-US" dirty="0" smtClean="0"/>
+              <a:t>Manage </a:t>
+            </a:r>
+            <a:r>
+              <a:rPr lang="en-US" dirty="0" smtClean="0"/>
+              <a:t>Existing Database Items (e.g. words or phrases)</a:t>
+            </a:r>
+          </a:p>
+          <a:p>
+            <a:r>
+              <a:rPr lang="en-US" dirty="0" smtClean="0"/>
+              <a:t>Manage Test </a:t>
+            </a:r>
+            <a:r>
+              <a:rPr lang="en-US" dirty="0" smtClean="0"/>
+              <a:t>Items</a:t>
+            </a:r>
+          </a:p>
+          <a:p>
+            <a:r>
+              <a:rPr lang="en-US" dirty="0" smtClean="0"/>
+              <a:t>Associate </a:t>
+            </a:r>
+            <a:r>
+              <a:rPr lang="en-US" dirty="0" smtClean="0"/>
+              <a:t>Images </a:t>
+            </a:r>
+            <a:r>
+              <a:rPr lang="en-US" dirty="0" smtClean="0"/>
+              <a:t>to Existing Items</a:t>
+            </a:r>
+          </a:p>
+          <a:p>
+            <a:r>
+              <a:rPr lang="en-US" dirty="0" smtClean="0"/>
+              <a:t>Display Progress Meter During the User Test</a:t>
+            </a:r>
+          </a:p>
+          <a:p>
+            <a:r>
+              <a:rPr lang="en-US" dirty="0" smtClean="0"/>
+              <a:t>View Test Results</a:t>
+            </a:r>
+          </a:p>
+          <a:p>
+            <a:pPr lvl="1"/>
             <a:endParaRPr lang="en-US" dirty="0" smtClean="0"/>
           </a:p>
           <a:p>
@@ -4880,7 +5431,7 @@
           <a:p>
             <a:r>
               <a:rPr lang="en-US" dirty="0" smtClean="0"/>
-              <a:t>Approach</a:t>
+              <a:t>Overview – Admin Test Setup</a:t>
             </a:r>
             <a:endParaRPr lang="en-US" dirty="0"/>
           </a:p>
@@ -4889,7 +5440,7 @@
     </p:spTree>
     <p:extLst>
       <p:ext uri="{BB962C8B-B14F-4D97-AF65-F5344CB8AC3E}">
-        <p14:creationId xmlns:p14="http://schemas.microsoft.com/office/powerpoint/2010/main" val="2933535503"/>
+        <p14:creationId xmlns:p14="http://schemas.microsoft.com/office/powerpoint/2010/main" val="344505319"/>
       </p:ext>
     </p:extLst>
   </p:cSld>
@@ -4950,6 +5501,7 @@
           <a:bodyPr/>
           <a:lstStyle/>
           <a:p>
+            <a:pPr lvl="1"/>
             <a:endParaRPr lang="en-US" dirty="0" smtClean="0"/>
           </a:p>
           <a:p>
@@ -4974,16 +5526,40 @@
           <a:p>
             <a:r>
               <a:rPr lang="en-US" dirty="0" smtClean="0"/>
-              <a:t>Challenges / Lessons Learned</a:t>
-            </a:r>
-            <a:endParaRPr lang="en-US" dirty="0"/>
-          </a:p>
-        </p:txBody>
-      </p:sp>
+              <a:t>Overview – Admin Test Setup Screen</a:t>
+            </a:r>
+            <a:endParaRPr lang="en-US" dirty="0"/>
+          </a:p>
+        </p:txBody>
+      </p:sp>
+      <p:pic>
+        <p:nvPicPr>
+          <p:cNvPr id="6" name="Picture 5"/>
+          <p:cNvPicPr>
+            <a:picLocks noChangeAspect="1"/>
+          </p:cNvPicPr>
+          <p:nvPr/>
+        </p:nvPicPr>
+        <p:blipFill>
+          <a:blip r:embed="rId2"/>
+          <a:stretch>
+            <a:fillRect/>
+          </a:stretch>
+        </p:blipFill>
+        <p:spPr>
+          <a:xfrm>
+            <a:off x="1049868" y="1253067"/>
+            <a:ext cx="10182123" cy="5418813"/>
+          </a:xfrm>
+          <a:prstGeom prst="rect">
+            <a:avLst/>
+          </a:prstGeom>
+        </p:spPr>
+      </p:pic>
     </p:spTree>
     <p:extLst>
       <p:ext uri="{BB962C8B-B14F-4D97-AF65-F5344CB8AC3E}">
-        <p14:creationId xmlns:p14="http://schemas.microsoft.com/office/powerpoint/2010/main" val="588025368"/>
+        <p14:creationId xmlns:p14="http://schemas.microsoft.com/office/powerpoint/2010/main" val="1453078861"/>
       </p:ext>
     </p:extLst>
   </p:cSld>
@@ -5068,7 +5644,7 @@
           <a:p>
             <a:r>
               <a:rPr lang="en-US" dirty="0" smtClean="0"/>
-              <a:t>Overview</a:t>
+              <a:t>Overview – User Test</a:t>
             </a:r>
             <a:endParaRPr lang="en-US" dirty="0"/>
           </a:p>
@@ -5077,7 +5653,147 @@
     </p:spTree>
     <p:extLst>
       <p:ext uri="{BB962C8B-B14F-4D97-AF65-F5344CB8AC3E}">
-        <p14:creationId xmlns:p14="http://schemas.microsoft.com/office/powerpoint/2010/main" val="2370716947"/>
+        <p14:creationId xmlns:p14="http://schemas.microsoft.com/office/powerpoint/2010/main" val="3467767327"/>
+      </p:ext>
+    </p:extLst>
+  </p:cSld>
+  <p:clrMapOvr>
+    <a:masterClrMapping/>
+  </p:clrMapOvr>
+  <mc:AlternateContent xmlns:mc="http://schemas.openxmlformats.org/markup-compatibility/2006" xmlns:p14="http://schemas.microsoft.com/office/powerpoint/2010/main">
+    <mc:Choice Requires="p14">
+      <p:transition spd="med" p14:dur="700">
+        <p:fade/>
+      </p:transition>
+    </mc:Choice>
+    <mc:Fallback xmlns="">
+      <p:transition spd="med">
+        <p:fade/>
+      </p:transition>
+    </mc:Fallback>
+  </mc:AlternateContent>
+  <p:timing>
+    <p:tnLst>
+      <p:par>
+        <p:cTn id="1" dur="indefinite" restart="never" nodeType="tmRoot"/>
+      </p:par>
+    </p:tnLst>
+  </p:timing>
+</p:sld>
+</file>
+
+<file path=ppt/slides/slide9.xml><?xml version="1.0" encoding="utf-8"?>
+<p:sld xmlns:a="http://schemas.openxmlformats.org/drawingml/2006/main" xmlns:r="http://schemas.openxmlformats.org/officeDocument/2006/relationships" xmlns:p="http://schemas.openxmlformats.org/presentationml/2006/main">
+  <p:cSld>
+    <p:spTree>
+      <p:nvGrpSpPr>
+        <p:cNvPr id="1" name=""/>
+        <p:cNvGrpSpPr/>
+        <p:nvPr/>
+      </p:nvGrpSpPr>
+      <p:grpSpPr>
+        <a:xfrm>
+          <a:off x="0" y="0"/>
+          <a:ext cx="0" cy="0"/>
+          <a:chOff x="0" y="0"/>
+          <a:chExt cx="0" cy="0"/>
+        </a:xfrm>
+      </p:grpSpPr>
+      <p:sp>
+        <p:nvSpPr>
+          <p:cNvPr id="3" name="Content Placeholder 2"/>
+          <p:cNvSpPr>
+            <a:spLocks noGrp="1"/>
+          </p:cNvSpPr>
+          <p:nvPr>
+            <p:ph idx="1"/>
+          </p:nvPr>
+        </p:nvSpPr>
+        <p:spPr/>
+        <p:txBody>
+          <a:bodyPr/>
+          <a:lstStyle/>
+          <a:p>
+            <a:pPr lvl="1"/>
+            <a:endParaRPr lang="en-US" dirty="0" smtClean="0"/>
+          </a:p>
+          <a:p>
+            <a:endParaRPr lang="en-US" dirty="0"/>
+          </a:p>
+        </p:txBody>
+      </p:sp>
+      <p:pic>
+        <p:nvPicPr>
+          <p:cNvPr id="4" name="Picture 3"/>
+          <p:cNvPicPr>
+            <a:picLocks noChangeAspect="1"/>
+          </p:cNvPicPr>
+          <p:nvPr/>
+        </p:nvPicPr>
+        <p:blipFill>
+          <a:blip r:embed="rId2"/>
+          <a:stretch>
+            <a:fillRect/>
+          </a:stretch>
+        </p:blipFill>
+        <p:spPr>
+          <a:xfrm>
+            <a:off x="4255029" y="119021"/>
+            <a:ext cx="6679142" cy="6641084"/>
+          </a:xfrm>
+          <a:prstGeom prst="rect">
+            <a:avLst/>
+          </a:prstGeom>
+        </p:spPr>
+      </p:pic>
+      <p:sp>
+        <p:nvSpPr>
+          <p:cNvPr id="5" name="Title 4"/>
+          <p:cNvSpPr>
+            <a:spLocks noGrp="1"/>
+          </p:cNvSpPr>
+          <p:nvPr>
+            <p:ph type="title"/>
+          </p:nvPr>
+        </p:nvSpPr>
+        <p:spPr>
+          <a:xfrm>
+            <a:off x="609600" y="274638"/>
+            <a:ext cx="4013200" cy="6380162"/>
+          </a:xfrm>
+        </p:spPr>
+        <p:txBody>
+          <a:bodyPr>
+            <a:normAutofit/>
+          </a:bodyPr>
+          <a:lstStyle/>
+          <a:p>
+            <a:r>
+              <a:rPr lang="en-US" dirty="0" smtClean="0"/>
+              <a:t>Overview </a:t>
+            </a:r>
+            <a:br>
+              <a:rPr lang="en-US" dirty="0" smtClean="0"/>
+            </a:br>
+            <a:r>
+              <a:rPr lang="en-US" dirty="0" smtClean="0"/>
+              <a:t>User Test </a:t>
+            </a:r>
+            <a:br>
+              <a:rPr lang="en-US" dirty="0" smtClean="0"/>
+            </a:br>
+            <a:r>
+              <a:rPr lang="en-US" dirty="0" smtClean="0"/>
+              <a:t>Screen</a:t>
+            </a:r>
+            <a:endParaRPr lang="en-US" dirty="0"/>
+          </a:p>
+        </p:txBody>
+      </p:sp>
+    </p:spTree>
+    <p:extLst>
+      <p:ext uri="{BB962C8B-B14F-4D97-AF65-F5344CB8AC3E}">
+        <p14:creationId xmlns:p14="http://schemas.microsoft.com/office/powerpoint/2010/main" val="2655541122"/>
       </p:ext>
     </p:extLst>
   </p:cSld>

</xml_diff>

<commit_message>
added animation and transitions
</commit_message>
<xml_diff>
--- a/assigns/assign10/t1-a10.pptx
+++ b/assigns/assign10/t1-a10.pptx
@@ -8535,14 +8535,49 @@
                             </p:stCondLst>
                             <p:childTnLst>
                               <p:par>
-                                <p:cTn id="5" presetID="1" presetClass="entr" presetSubtype="0" fill="hold" nodeType="withEffect">
+                                <p:cTn id="5" presetID="22" presetClass="entr" presetSubtype="8" fill="hold" grpId="0" nodeType="withEffect">
                                   <p:stCondLst>
-                                    <p:cond delay="500"/>
+                                    <p:cond delay="0"/>
                                   </p:stCondLst>
                                   <p:childTnLst>
                                     <p:set>
                                       <p:cBhvr>
                                         <p:cTn id="6" dur="1" fill="hold">
+                                          <p:stCondLst>
+                                            <p:cond delay="0"/>
+                                          </p:stCondLst>
+                                        </p:cTn>
+                                        <p:tgtEl>
+                                          <p:spTgt spid="2"/>
+                                        </p:tgtEl>
+                                        <p:attrNameLst>
+                                          <p:attrName>style.visibility</p:attrName>
+                                        </p:attrNameLst>
+                                      </p:cBhvr>
+                                      <p:to>
+                                        <p:strVal val="visible"/>
+                                      </p:to>
+                                    </p:set>
+                                    <p:animEffect transition="in" filter="wipe(left)">
+                                      <p:cBhvr>
+                                        <p:cTn id="7" dur="500"/>
+                                        <p:tgtEl>
+                                          <p:spTgt spid="2"/>
+                                        </p:tgtEl>
+                                      </p:cBhvr>
+                                    </p:animEffect>
+                                  </p:childTnLst>
+                                </p:cTn>
+                              </p:par>
+                              <p:par>
+                                <p:cTn id="8" presetID="1" presetClass="entr" presetSubtype="0" fill="hold" nodeType="withEffect">
+                                  <p:stCondLst>
+                                    <p:cond delay="1000"/>
+                                  </p:stCondLst>
+                                  <p:childTnLst>
+                                    <p:set>
+                                      <p:cBhvr>
+                                        <p:cTn id="9" dur="1" fill="hold">
                                           <p:stCondLst>
                                             <p:cond delay="0"/>
                                           </p:stCondLst>
@@ -8572,26 +8607,26 @@
                     </p:cTn>
                   </p:par>
                   <p:par>
-                    <p:cTn id="7" fill="hold">
+                    <p:cTn id="10" fill="hold">
                       <p:stCondLst>
                         <p:cond delay="indefinite"/>
                       </p:stCondLst>
                       <p:childTnLst>
                         <p:par>
-                          <p:cTn id="8" fill="hold">
+                          <p:cTn id="11" fill="hold">
                             <p:stCondLst>
                               <p:cond delay="0"/>
                             </p:stCondLst>
                             <p:childTnLst>
                               <p:par>
-                                <p:cTn id="9" presetID="1" presetClass="entr" presetSubtype="0" fill="hold" nodeType="clickEffect">
+                                <p:cTn id="12" presetID="1" presetClass="entr" presetSubtype="0" fill="hold" nodeType="clickEffect">
                                   <p:stCondLst>
                                     <p:cond delay="0"/>
                                   </p:stCondLst>
                                   <p:childTnLst>
                                     <p:set>
                                       <p:cBhvr>
-                                        <p:cTn id="10" dur="1" fill="hold">
+                                        <p:cTn id="13" dur="1" fill="hold">
                                           <p:stCondLst>
                                             <p:cond delay="0"/>
                                           </p:stCondLst>
@@ -8621,26 +8656,26 @@
                     </p:cTn>
                   </p:par>
                   <p:par>
-                    <p:cTn id="11" fill="hold">
+                    <p:cTn id="14" fill="hold">
                       <p:stCondLst>
                         <p:cond delay="indefinite"/>
                       </p:stCondLst>
                       <p:childTnLst>
                         <p:par>
-                          <p:cTn id="12" fill="hold">
+                          <p:cTn id="15" fill="hold">
                             <p:stCondLst>
                               <p:cond delay="0"/>
                             </p:stCondLst>
                             <p:childTnLst>
                               <p:par>
-                                <p:cTn id="13" presetID="1" presetClass="entr" presetSubtype="0" fill="hold" nodeType="clickEffect">
+                                <p:cTn id="16" presetID="1" presetClass="entr" presetSubtype="0" fill="hold" nodeType="clickEffect">
                                   <p:stCondLst>
                                     <p:cond delay="0"/>
                                   </p:stCondLst>
                                   <p:childTnLst>
                                     <p:set>
                                       <p:cBhvr>
-                                        <p:cTn id="14" dur="1" fill="hold">
+                                        <p:cTn id="17" dur="1" fill="hold">
                                           <p:stCondLst>
                                             <p:cond delay="0"/>
                                           </p:stCondLst>
@@ -8670,26 +8705,26 @@
                     </p:cTn>
                   </p:par>
                   <p:par>
-                    <p:cTn id="15" fill="hold">
+                    <p:cTn id="18" fill="hold">
                       <p:stCondLst>
                         <p:cond delay="indefinite"/>
                       </p:stCondLst>
                       <p:childTnLst>
                         <p:par>
-                          <p:cTn id="16" fill="hold">
+                          <p:cTn id="19" fill="hold">
                             <p:stCondLst>
                               <p:cond delay="0"/>
                             </p:stCondLst>
                             <p:childTnLst>
                               <p:par>
-                                <p:cTn id="17" presetID="1" presetClass="entr" presetSubtype="0" fill="hold" nodeType="clickEffect">
+                                <p:cTn id="20" presetID="1" presetClass="entr" presetSubtype="0" fill="hold" nodeType="clickEffect">
                                   <p:stCondLst>
                                     <p:cond delay="0"/>
                                   </p:stCondLst>
                                   <p:childTnLst>
                                     <p:set>
                                       <p:cBhvr>
-                                        <p:cTn id="18" dur="1" fill="hold">
+                                        <p:cTn id="21" dur="1" fill="hold">
                                           <p:stCondLst>
                                             <p:cond delay="0"/>
                                           </p:stCondLst>
@@ -8719,26 +8754,26 @@
                     </p:cTn>
                   </p:par>
                   <p:par>
-                    <p:cTn id="19" fill="hold">
+                    <p:cTn id="22" fill="hold">
                       <p:stCondLst>
                         <p:cond delay="indefinite"/>
                       </p:stCondLst>
                       <p:childTnLst>
                         <p:par>
-                          <p:cTn id="20" fill="hold">
+                          <p:cTn id="23" fill="hold">
                             <p:stCondLst>
                               <p:cond delay="0"/>
                             </p:stCondLst>
                             <p:childTnLst>
                               <p:par>
-                                <p:cTn id="21" presetID="1" presetClass="entr" presetSubtype="0" fill="hold" nodeType="clickEffect">
+                                <p:cTn id="24" presetID="1" presetClass="entr" presetSubtype="0" fill="hold" nodeType="clickEffect">
                                   <p:stCondLst>
                                     <p:cond delay="0"/>
                                   </p:stCondLst>
                                   <p:childTnLst>
                                     <p:set>
                                       <p:cBhvr>
-                                        <p:cTn id="22" dur="1" fill="hold">
+                                        <p:cTn id="25" dur="1" fill="hold">
                                           <p:stCondLst>
                                             <p:cond delay="0"/>
                                           </p:stCondLst>
@@ -8788,6 +8823,9 @@
         </p:cTn>
       </p:par>
     </p:tnLst>
+    <p:bldLst>
+      <p:bldP spid="2" grpId="0"/>
+    </p:bldLst>
   </p:timing>
 </p:sld>
 </file>

</xml_diff>

<commit_message>
updated code and presentation as discussed
</commit_message>
<xml_diff>
--- a/assigns/assign10/t1-a10.pptx
+++ b/assigns/assign10/t1-a10.pptx
@@ -4199,67 +4199,6 @@
           <a:chExt cx="0" cy="0"/>
         </a:xfrm>
       </p:grpSpPr>
-      <p:sp>
-        <p:nvSpPr>
-          <p:cNvPr id="2" name="Subtitle 1"/>
-          <p:cNvSpPr>
-            <a:spLocks noGrp="1"/>
-          </p:cNvSpPr>
-          <p:nvPr>
-            <p:ph type="subTitle" idx="1"/>
-          </p:nvPr>
-        </p:nvSpPr>
-        <p:spPr/>
-        <p:txBody>
-          <a:bodyPr>
-            <a:normAutofit/>
-          </a:bodyPr>
-          <a:lstStyle/>
-          <a:p>
-            <a:r>
-              <a:rPr lang="en-US" dirty="0" smtClean="0"/>
-              <a:t>TODO</a:t>
-            </a:r>
-          </a:p>
-          <a:p>
-            <a:r>
-              <a:rPr lang="en-US" dirty="0" smtClean="0"/>
-              <a:t> </a:t>
-            </a:r>
-          </a:p>
-          <a:p>
-            <a:r>
-              <a:rPr lang="en-US" dirty="0" smtClean="0"/>
-              <a:t>Update Result Query for ties to that it sorts by item value</a:t>
-            </a:r>
-          </a:p>
-          <a:p>
-            <a:r>
-              <a:rPr lang="en-US" dirty="0" smtClean="0"/>
-              <a:t>Add Registration Screenshot to panel</a:t>
-            </a:r>
-          </a:p>
-        </p:txBody>
-      </p:sp>
-      <p:sp>
-        <p:nvSpPr>
-          <p:cNvPr id="3" name="Title 2"/>
-          <p:cNvSpPr>
-            <a:spLocks noGrp="1"/>
-          </p:cNvSpPr>
-          <p:nvPr>
-            <p:ph type="ctrTitle"/>
-          </p:nvPr>
-        </p:nvSpPr>
-        <p:spPr/>
-        <p:txBody>
-          <a:bodyPr/>
-          <a:lstStyle/>
-          <a:p>
-            <a:endParaRPr lang="en-US"/>
-          </a:p>
-        </p:txBody>
-      </p:sp>
     </p:spTree>
     <p:extLst>
       <p:ext uri="{BB962C8B-B14F-4D97-AF65-F5344CB8AC3E}">
@@ -4270,13 +4209,13 @@
   <p:clrMapOvr>
     <a:masterClrMapping/>
   </p:clrMapOvr>
-  <mc:AlternateContent xmlns:mc="http://schemas.openxmlformats.org/markup-compatibility/2006">
-    <mc:Choice xmlns:p14="http://schemas.microsoft.com/office/powerpoint/2010/main" Requires="p14">
+  <mc:AlternateContent xmlns:mc="http://schemas.openxmlformats.org/markup-compatibility/2006" xmlns:p14="http://schemas.microsoft.com/office/powerpoint/2010/main">
+    <mc:Choice Requires="p14">
       <p:transition spd="med" p14:dur="700">
         <p:fade/>
       </p:transition>
     </mc:Choice>
-    <mc:Fallback>
+    <mc:Fallback xmlns="">
       <p:transition spd="med">
         <p:fade/>
       </p:transition>
@@ -4357,7 +4296,7 @@
       </p:sp>
       <p:pic>
         <p:nvPicPr>
-          <p:cNvPr id="6" name="Picture 5"/>
+          <p:cNvPr id="4" name="Picture 3"/>
           <p:cNvPicPr>
             <a:picLocks noChangeAspect="1"/>
           </p:cNvPicPr>
@@ -4371,8 +4310,8 @@
         </p:blipFill>
         <p:spPr>
           <a:xfrm>
-            <a:off x="1036220" y="1307658"/>
-            <a:ext cx="10182123" cy="5418813"/>
+            <a:off x="1524000" y="1544069"/>
+            <a:ext cx="8715375" cy="4638226"/>
           </a:xfrm>
           <a:prstGeom prst="rect">
             <a:avLst/>
@@ -4425,49 +4364,14 @@
                             </p:stCondLst>
                             <p:childTnLst>
                               <p:par>
-                                <p:cTn id="5" presetID="10" presetClass="entr" presetSubtype="0" fill="hold" nodeType="withEffect">
-                                  <p:stCondLst>
-                                    <p:cond delay="1000"/>
-                                  </p:stCondLst>
-                                  <p:childTnLst>
-                                    <p:set>
-                                      <p:cBhvr>
-                                        <p:cTn id="6" dur="1" fill="hold">
-                                          <p:stCondLst>
-                                            <p:cond delay="0"/>
-                                          </p:stCondLst>
-                                        </p:cTn>
-                                        <p:tgtEl>
-                                          <p:spTgt spid="6"/>
-                                        </p:tgtEl>
-                                        <p:attrNameLst>
-                                          <p:attrName>style.visibility</p:attrName>
-                                        </p:attrNameLst>
-                                      </p:cBhvr>
-                                      <p:to>
-                                        <p:strVal val="visible"/>
-                                      </p:to>
-                                    </p:set>
-                                    <p:animEffect transition="in" filter="fade">
-                                      <p:cBhvr>
-                                        <p:cTn id="7" dur="10"/>
-                                        <p:tgtEl>
-                                          <p:spTgt spid="6"/>
-                                        </p:tgtEl>
-                                      </p:cBhvr>
-                                    </p:animEffect>
-                                  </p:childTnLst>
-                                </p:cTn>
-                              </p:par>
-                              <p:par>
-                                <p:cTn id="8" presetID="22" presetClass="entr" presetSubtype="8" fill="hold" grpId="0" nodeType="withEffect">
+                                <p:cTn id="5" presetID="22" presetClass="entr" presetSubtype="8" fill="hold" grpId="0" nodeType="withEffect">
                                   <p:stCondLst>
                                     <p:cond delay="0"/>
                                   </p:stCondLst>
                                   <p:childTnLst>
                                     <p:set>
                                       <p:cBhvr>
-                                        <p:cTn id="9" dur="1" fill="hold">
+                                        <p:cTn id="6" dur="1" fill="hold">
                                           <p:stCondLst>
                                             <p:cond delay="0"/>
                                           </p:stCondLst>
@@ -4485,9 +4389,44 @@
                                     </p:set>
                                     <p:animEffect transition="in" filter="wipe(left)">
                                       <p:cBhvr>
+                                        <p:cTn id="7" dur="1000"/>
+                                        <p:tgtEl>
+                                          <p:spTgt spid="2"/>
+                                        </p:tgtEl>
+                                      </p:cBhvr>
+                                    </p:animEffect>
+                                  </p:childTnLst>
+                                </p:cTn>
+                              </p:par>
+                              <p:par>
+                                <p:cTn id="8" presetID="10" presetClass="entr" presetSubtype="0" fill="hold" nodeType="withEffect">
+                                  <p:stCondLst>
+                                    <p:cond delay="1000"/>
+                                  </p:stCondLst>
+                                  <p:childTnLst>
+                                    <p:set>
+                                      <p:cBhvr>
+                                        <p:cTn id="9" dur="1" fill="hold">
+                                          <p:stCondLst>
+                                            <p:cond delay="0"/>
+                                          </p:stCondLst>
+                                        </p:cTn>
+                                        <p:tgtEl>
+                                          <p:spTgt spid="4"/>
+                                        </p:tgtEl>
+                                        <p:attrNameLst>
+                                          <p:attrName>style.visibility</p:attrName>
+                                        </p:attrNameLst>
+                                      </p:cBhvr>
+                                      <p:to>
+                                        <p:strVal val="visible"/>
+                                      </p:to>
+                                    </p:set>
+                                    <p:animEffect transition="in" filter="fade">
+                                      <p:cBhvr>
                                         <p:cTn id="10" dur="500"/>
                                         <p:tgtEl>
-                                          <p:spTgt spid="2"/>
+                                          <p:spTgt spid="4"/>
                                         </p:tgtEl>
                                       </p:cBhvr>
                                     </p:animEffect>
@@ -4567,11 +4506,7 @@
           <a:p>
             <a:r>
               <a:rPr lang="en-US" sz="4000" dirty="0" smtClean="0"/>
-              <a:t>Assigns User </a:t>
-            </a:r>
-            <a:r>
-              <a:rPr lang="en-US" sz="4000" dirty="0" smtClean="0"/>
-              <a:t>A Unique Test Session ID</a:t>
+              <a:t>Assigns User A Unique Test Session ID</a:t>
             </a:r>
           </a:p>
           <a:p>
@@ -4700,7 +4635,7 @@
                                     </p:set>
                                     <p:animEffect transition="in" filter="wipe(left)">
                                       <p:cBhvr>
-                                        <p:cTn id="7" dur="500"/>
+                                        <p:cTn id="7" dur="1250"/>
                                         <p:tgtEl>
                                           <p:spTgt spid="2"/>
                                         </p:tgtEl>
@@ -4712,7 +4647,7 @@
                               <p:par>
                                 <p:cTn id="8" presetID="1" presetClass="entr" presetSubtype="0" fill="hold" nodeType="withEffect">
                                   <p:stCondLst>
-                                    <p:cond delay="1000"/>
+                                    <p:cond delay="1250"/>
                                   </p:stCondLst>
                                   <p:childTnLst>
                                     <p:set>
@@ -4961,9 +4896,53 @@
           </a:p>
         </p:txBody>
       </p:sp>
+      <p:sp>
+        <p:nvSpPr>
+          <p:cNvPr id="5" name="Title 4"/>
+          <p:cNvSpPr>
+            <a:spLocks noGrp="1"/>
+          </p:cNvSpPr>
+          <p:nvPr>
+            <p:ph type="title"/>
+          </p:nvPr>
+        </p:nvSpPr>
+        <p:spPr>
+          <a:xfrm>
+            <a:off x="609600" y="274638"/>
+            <a:ext cx="4013200" cy="6380162"/>
+          </a:xfrm>
+        </p:spPr>
+        <p:txBody>
+          <a:bodyPr anchor="t">
+            <a:normAutofit/>
+          </a:bodyPr>
+          <a:lstStyle/>
+          <a:p>
+            <a:r>
+              <a:rPr lang="en-US" dirty="0" smtClean="0"/>
+              <a:t>Overview -  </a:t>
+            </a:r>
+            <a:br>
+              <a:rPr lang="en-US" dirty="0" smtClean="0"/>
+            </a:br>
+            <a:r>
+              <a:rPr lang="en-US" dirty="0" smtClean="0"/>
+              <a:t>User Test </a:t>
+            </a:r>
+            <a:br>
+              <a:rPr lang="en-US" dirty="0" smtClean="0"/>
+            </a:br>
+            <a:r>
+              <a:rPr lang="en-US" dirty="0" smtClean="0"/>
+              <a:t>Screen</a:t>
+            </a:r>
+            <a:endParaRPr lang="en-US" dirty="0"/>
+          </a:p>
+        </p:txBody>
+      </p:sp>
       <p:pic>
         <p:nvPicPr>
-          <p:cNvPr id="4" name="Picture 3"/>
+          <p:cNvPr id="2" name="Picture 1"/>
           <p:cNvPicPr>
             <a:picLocks noChangeAspect="1"/>
           </p:cNvPicPr>
@@ -4977,58 +4956,14 @@
         </p:blipFill>
         <p:spPr>
           <a:xfrm>
-            <a:off x="4255029" y="119021"/>
-            <a:ext cx="6679142" cy="6641084"/>
+            <a:off x="4400550" y="140494"/>
+            <a:ext cx="6686550" cy="6648450"/>
           </a:xfrm>
           <a:prstGeom prst="rect">
             <a:avLst/>
           </a:prstGeom>
         </p:spPr>
       </p:pic>
-      <p:sp>
-        <p:nvSpPr>
-          <p:cNvPr id="5" name="Title 4"/>
-          <p:cNvSpPr>
-            <a:spLocks noGrp="1"/>
-          </p:cNvSpPr>
-          <p:nvPr>
-            <p:ph type="title"/>
-          </p:nvPr>
-        </p:nvSpPr>
-        <p:spPr>
-          <a:xfrm>
-            <a:off x="609600" y="274638"/>
-            <a:ext cx="4013200" cy="6380162"/>
-          </a:xfrm>
-        </p:spPr>
-        <p:txBody>
-          <a:bodyPr anchor="t">
-            <a:normAutofit/>
-          </a:bodyPr>
-          <a:lstStyle/>
-          <a:p>
-            <a:r>
-              <a:rPr lang="en-US" dirty="0" smtClean="0"/>
-              <a:t>Overview -  </a:t>
-            </a:r>
-            <a:br>
-              <a:rPr lang="en-US" dirty="0" smtClean="0"/>
-            </a:br>
-            <a:r>
-              <a:rPr lang="en-US" dirty="0" smtClean="0"/>
-              <a:t>User Test </a:t>
-            </a:r>
-            <a:br>
-              <a:rPr lang="en-US" dirty="0" smtClean="0"/>
-            </a:br>
-            <a:r>
-              <a:rPr lang="en-US" dirty="0" smtClean="0"/>
-              <a:t>Screen</a:t>
-            </a:r>
-            <a:endParaRPr lang="en-US" dirty="0"/>
-          </a:p>
-        </p:txBody>
-      </p:sp>
     </p:spTree>
     <p:extLst>
       <p:ext uri="{BB962C8B-B14F-4D97-AF65-F5344CB8AC3E}">
@@ -5100,7 +5035,7 @@
                                     </p:set>
                                     <p:animEffect transition="in" filter="wipe(up)">
                                       <p:cBhvr>
-                                        <p:cTn id="7" dur="500"/>
+                                        <p:cTn id="7" dur="1000"/>
                                         <p:tgtEl>
                                           <p:spTgt spid="5"/>
                                         </p:tgtEl>
@@ -5123,7 +5058,7 @@
                                           </p:stCondLst>
                                         </p:cTn>
                                         <p:tgtEl>
-                                          <p:spTgt spid="4"/>
+                                          <p:spTgt spid="2"/>
                                         </p:tgtEl>
                                         <p:attrNameLst>
                                           <p:attrName>style.visibility</p:attrName>
@@ -5135,9 +5070,9 @@
                                     </p:set>
                                     <p:animEffect transition="in" filter="fade">
                                       <p:cBhvr>
-                                        <p:cTn id="10" dur="10"/>
+                                        <p:cTn id="10" dur="500"/>
                                         <p:tgtEl>
-                                          <p:spTgt spid="4"/>
+                                          <p:spTgt spid="2"/>
                                         </p:tgtEl>
                                       </p:cBhvr>
                                     </p:animEffect>
@@ -5195,28 +5130,6 @@
           <a:chExt cx="0" cy="0"/>
         </a:xfrm>
       </p:grpSpPr>
-      <p:sp>
-        <p:nvSpPr>
-          <p:cNvPr id="3" name="Content Placeholder 2"/>
-          <p:cNvSpPr>
-            <a:spLocks noGrp="1"/>
-          </p:cNvSpPr>
-          <p:nvPr>
-            <p:ph idx="1"/>
-          </p:nvPr>
-        </p:nvSpPr>
-        <p:spPr/>
-        <p:txBody>
-          <a:bodyPr/>
-          <a:lstStyle/>
-          <a:p>
-            <a:endParaRPr lang="en-US" dirty="0" smtClean="0"/>
-          </a:p>
-          <a:p>
-            <a:endParaRPr lang="en-US" dirty="0"/>
-          </a:p>
-        </p:txBody>
-      </p:sp>
       <p:sp>
         <p:nvSpPr>
           <p:cNvPr id="2" name="Title 1"/>
@@ -5458,12 +5371,12 @@
               <a:t>Select User, then </a:t>
             </a:r>
             <a:r>
-              <a:rPr lang="en-US" sz="4000" dirty="0" err="1"/>
-              <a:t>TestID</a:t>
+              <a:rPr lang="en-US" sz="4000" dirty="0" smtClean="0"/>
+              <a:t>Test ID </a:t>
             </a:r>
             <a:r>
               <a:rPr lang="en-US" sz="4000" dirty="0"/>
-              <a:t> and Date, and View </a:t>
+              <a:t>and Date, and View </a:t>
             </a:r>
             <a:r>
               <a:rPr lang="en-US" sz="4000" dirty="0" smtClean="0"/>
@@ -5485,6 +5398,389 @@
     <p:extLst>
       <p:ext uri="{BB962C8B-B14F-4D97-AF65-F5344CB8AC3E}">
         <p14:creationId xmlns:p14="http://schemas.microsoft.com/office/powerpoint/2010/main" val="3330300547"/>
+      </p:ext>
+    </p:extLst>
+  </p:cSld>
+  <p:clrMapOvr>
+    <a:masterClrMapping/>
+  </p:clrMapOvr>
+  <mc:AlternateContent xmlns:mc="http://schemas.openxmlformats.org/markup-compatibility/2006" xmlns:p14="http://schemas.microsoft.com/office/powerpoint/2010/main">
+    <mc:Choice Requires="p14">
+      <p:transition spd="med" p14:dur="700">
+        <p:fade/>
+      </p:transition>
+    </mc:Choice>
+    <mc:Fallback xmlns="">
+      <p:transition spd="med">
+        <p:fade/>
+      </p:transition>
+    </mc:Fallback>
+  </mc:AlternateContent>
+  <p:timing>
+    <p:tnLst>
+      <p:par>
+        <p:cTn id="1" dur="indefinite" restart="never" nodeType="tmRoot">
+          <p:childTnLst>
+            <p:seq concurrent="1" nextAc="seek">
+              <p:cTn id="2" dur="indefinite" nodeType="mainSeq">
+                <p:childTnLst>
+                  <p:par>
+                    <p:cTn id="3" fill="hold">
+                      <p:stCondLst>
+                        <p:cond delay="indefinite"/>
+                        <p:cond evt="onBegin" delay="0">
+                          <p:tn val="2"/>
+                        </p:cond>
+                      </p:stCondLst>
+                      <p:childTnLst>
+                        <p:par>
+                          <p:cTn id="4" fill="hold">
+                            <p:stCondLst>
+                              <p:cond delay="0"/>
+                            </p:stCondLst>
+                            <p:childTnLst>
+                              <p:par>
+                                <p:cTn id="5" presetID="1" presetClass="entr" presetSubtype="0" fill="hold" nodeType="withEffect">
+                                  <p:stCondLst>
+                                    <p:cond delay="1250"/>
+                                  </p:stCondLst>
+                                  <p:childTnLst>
+                                    <p:set>
+                                      <p:cBhvr>
+                                        <p:cTn id="6" dur="1" fill="hold">
+                                          <p:stCondLst>
+                                            <p:cond delay="0"/>
+                                          </p:stCondLst>
+                                        </p:cTn>
+                                        <p:tgtEl>
+                                          <p:spTgt spid="4">
+                                            <p:txEl>
+                                              <p:pRg st="0" end="0"/>
+                                            </p:txEl>
+                                          </p:spTgt>
+                                        </p:tgtEl>
+                                        <p:attrNameLst>
+                                          <p:attrName>style.visibility</p:attrName>
+                                        </p:attrNameLst>
+                                      </p:cBhvr>
+                                      <p:to>
+                                        <p:strVal val="visible"/>
+                                      </p:to>
+                                    </p:set>
+                                  </p:childTnLst>
+                                </p:cTn>
+                              </p:par>
+                              <p:par>
+                                <p:cTn id="7" presetID="22" presetClass="entr" presetSubtype="8" fill="hold" grpId="0" nodeType="withEffect">
+                                  <p:stCondLst>
+                                    <p:cond delay="0"/>
+                                  </p:stCondLst>
+                                  <p:childTnLst>
+                                    <p:set>
+                                      <p:cBhvr>
+                                        <p:cTn id="8" dur="1" fill="hold">
+                                          <p:stCondLst>
+                                            <p:cond delay="0"/>
+                                          </p:stCondLst>
+                                        </p:cTn>
+                                        <p:tgtEl>
+                                          <p:spTgt spid="2"/>
+                                        </p:tgtEl>
+                                        <p:attrNameLst>
+                                          <p:attrName>style.visibility</p:attrName>
+                                        </p:attrNameLst>
+                                      </p:cBhvr>
+                                      <p:to>
+                                        <p:strVal val="visible"/>
+                                      </p:to>
+                                    </p:set>
+                                    <p:animEffect transition="in" filter="wipe(left)">
+                                      <p:cBhvr>
+                                        <p:cTn id="9" dur="1000"/>
+                                        <p:tgtEl>
+                                          <p:spTgt spid="2"/>
+                                        </p:tgtEl>
+                                      </p:cBhvr>
+                                    </p:animEffect>
+                                  </p:childTnLst>
+                                </p:cTn>
+                              </p:par>
+                            </p:childTnLst>
+                          </p:cTn>
+                        </p:par>
+                      </p:childTnLst>
+                    </p:cTn>
+                  </p:par>
+                  <p:par>
+                    <p:cTn id="10" fill="hold">
+                      <p:stCondLst>
+                        <p:cond delay="indefinite"/>
+                      </p:stCondLst>
+                      <p:childTnLst>
+                        <p:par>
+                          <p:cTn id="11" fill="hold">
+                            <p:stCondLst>
+                              <p:cond delay="0"/>
+                            </p:stCondLst>
+                            <p:childTnLst>
+                              <p:par>
+                                <p:cTn id="12" presetID="1" presetClass="entr" presetSubtype="0" fill="hold" grpId="0" nodeType="clickEffect">
+                                  <p:stCondLst>
+                                    <p:cond delay="0"/>
+                                  </p:stCondLst>
+                                  <p:childTnLst>
+                                    <p:set>
+                                      <p:cBhvr>
+                                        <p:cTn id="13" dur="1" fill="hold">
+                                          <p:stCondLst>
+                                            <p:cond delay="0"/>
+                                          </p:stCondLst>
+                                        </p:cTn>
+                                        <p:tgtEl>
+                                          <p:spTgt spid="4">
+                                            <p:txEl>
+                                              <p:pRg st="1" end="1"/>
+                                            </p:txEl>
+                                          </p:spTgt>
+                                        </p:tgtEl>
+                                        <p:attrNameLst>
+                                          <p:attrName>style.visibility</p:attrName>
+                                        </p:attrNameLst>
+                                      </p:cBhvr>
+                                      <p:to>
+                                        <p:strVal val="visible"/>
+                                      </p:to>
+                                    </p:set>
+                                  </p:childTnLst>
+                                </p:cTn>
+                              </p:par>
+                            </p:childTnLst>
+                          </p:cTn>
+                        </p:par>
+                      </p:childTnLst>
+                    </p:cTn>
+                  </p:par>
+                  <p:par>
+                    <p:cTn id="14" fill="hold">
+                      <p:stCondLst>
+                        <p:cond delay="indefinite"/>
+                      </p:stCondLst>
+                      <p:childTnLst>
+                        <p:par>
+                          <p:cTn id="15" fill="hold">
+                            <p:stCondLst>
+                              <p:cond delay="0"/>
+                            </p:stCondLst>
+                            <p:childTnLst>
+                              <p:par>
+                                <p:cTn id="16" presetID="1" presetClass="entr" presetSubtype="0" fill="hold" grpId="0" nodeType="clickEffect">
+                                  <p:stCondLst>
+                                    <p:cond delay="0"/>
+                                  </p:stCondLst>
+                                  <p:childTnLst>
+                                    <p:set>
+                                      <p:cBhvr>
+                                        <p:cTn id="17" dur="1" fill="hold">
+                                          <p:stCondLst>
+                                            <p:cond delay="0"/>
+                                          </p:stCondLst>
+                                        </p:cTn>
+                                        <p:tgtEl>
+                                          <p:spTgt spid="4">
+                                            <p:txEl>
+                                              <p:pRg st="2" end="2"/>
+                                            </p:txEl>
+                                          </p:spTgt>
+                                        </p:tgtEl>
+                                        <p:attrNameLst>
+                                          <p:attrName>style.visibility</p:attrName>
+                                        </p:attrNameLst>
+                                      </p:cBhvr>
+                                      <p:to>
+                                        <p:strVal val="visible"/>
+                                      </p:to>
+                                    </p:set>
+                                  </p:childTnLst>
+                                </p:cTn>
+                              </p:par>
+                            </p:childTnLst>
+                          </p:cTn>
+                        </p:par>
+                      </p:childTnLst>
+                    </p:cTn>
+                  </p:par>
+                </p:childTnLst>
+              </p:cTn>
+              <p:prevCondLst>
+                <p:cond evt="onPrev" delay="0">
+                  <p:tgtEl>
+                    <p:sldTgt/>
+                  </p:tgtEl>
+                </p:cond>
+              </p:prevCondLst>
+              <p:nextCondLst>
+                <p:cond evt="onNext" delay="0">
+                  <p:tgtEl>
+                    <p:sldTgt/>
+                  </p:tgtEl>
+                </p:cond>
+              </p:nextCondLst>
+            </p:seq>
+          </p:childTnLst>
+        </p:cTn>
+      </p:par>
+    </p:tnLst>
+    <p:bldLst>
+      <p:bldP spid="2" grpId="0"/>
+      <p:bldP spid="4" grpId="0" uiExpand="1" build="allAtOnce"/>
+    </p:bldLst>
+  </p:timing>
+</p:sld>
+</file>
+
+<file path=ppt/slides/slide14.xml><?xml version="1.0" encoding="utf-8"?>
+<p:sld xmlns:a="http://schemas.openxmlformats.org/drawingml/2006/main" xmlns:r="http://schemas.openxmlformats.org/officeDocument/2006/relationships" xmlns:p="http://schemas.openxmlformats.org/presentationml/2006/main">
+  <p:cSld>
+    <p:spTree>
+      <p:nvGrpSpPr>
+        <p:cNvPr id="1" name=""/>
+        <p:cNvGrpSpPr/>
+        <p:nvPr/>
+      </p:nvGrpSpPr>
+      <p:grpSpPr>
+        <a:xfrm>
+          <a:off x="0" y="0"/>
+          <a:ext cx="0" cy="0"/>
+          <a:chOff x="0" y="0"/>
+          <a:chExt cx="0" cy="0"/>
+        </a:xfrm>
+      </p:grpSpPr>
+      <p:sp>
+        <p:nvSpPr>
+          <p:cNvPr id="3" name="Content Placeholder 2"/>
+          <p:cNvSpPr>
+            <a:spLocks noGrp="1"/>
+          </p:cNvSpPr>
+          <p:nvPr>
+            <p:ph idx="1"/>
+          </p:nvPr>
+        </p:nvSpPr>
+        <p:spPr>
+          <a:xfrm>
+            <a:off x="609600" y="1595672"/>
+            <a:ext cx="9956800" cy="4525963"/>
+          </a:xfrm>
+        </p:spPr>
+        <p:txBody>
+          <a:bodyPr/>
+          <a:lstStyle/>
+          <a:p>
+            <a:pPr lvl="1"/>
+            <a:endParaRPr lang="en-US" dirty="0" smtClean="0"/>
+          </a:p>
+          <a:p>
+            <a:endParaRPr lang="en-US" dirty="0"/>
+          </a:p>
+        </p:txBody>
+      </p:sp>
+      <p:sp>
+        <p:nvSpPr>
+          <p:cNvPr id="5" name="Title 4"/>
+          <p:cNvSpPr>
+            <a:spLocks noGrp="1"/>
+          </p:cNvSpPr>
+          <p:nvPr>
+            <p:ph type="title"/>
+          </p:nvPr>
+        </p:nvSpPr>
+        <p:spPr/>
+        <p:txBody>
+          <a:bodyPr/>
+          <a:lstStyle/>
+          <a:p>
+            <a:r>
+              <a:rPr lang="en-US" dirty="0"/>
+              <a:t>Overview - Test Results Reporting</a:t>
+            </a:r>
+          </a:p>
+        </p:txBody>
+      </p:sp>
+      <p:pic>
+        <p:nvPicPr>
+          <p:cNvPr id="2" name="Picture 1"/>
+          <p:cNvPicPr>
+            <a:picLocks noChangeAspect="1"/>
+          </p:cNvPicPr>
+          <p:nvPr/>
+        </p:nvPicPr>
+        <p:blipFill>
+          <a:blip r:embed="rId2"/>
+          <a:stretch>
+            <a:fillRect/>
+          </a:stretch>
+        </p:blipFill>
+        <p:spPr>
+          <a:xfrm>
+            <a:off x="170391" y="1911026"/>
+            <a:ext cx="3905250" cy="3905250"/>
+          </a:xfrm>
+          <a:prstGeom prst="rect">
+            <a:avLst/>
+          </a:prstGeom>
+        </p:spPr>
+      </p:pic>
+      <p:pic>
+        <p:nvPicPr>
+          <p:cNvPr id="8" name="Picture 7"/>
+          <p:cNvPicPr>
+            <a:picLocks noChangeAspect="1"/>
+          </p:cNvPicPr>
+          <p:nvPr/>
+        </p:nvPicPr>
+        <p:blipFill>
+          <a:blip r:embed="rId3"/>
+          <a:stretch>
+            <a:fillRect/>
+          </a:stretch>
+        </p:blipFill>
+        <p:spPr>
+          <a:xfrm>
+            <a:off x="4143374" y="1906029"/>
+            <a:ext cx="3905250" cy="3905250"/>
+          </a:xfrm>
+          <a:prstGeom prst="rect">
+            <a:avLst/>
+          </a:prstGeom>
+        </p:spPr>
+      </p:pic>
+      <p:pic>
+        <p:nvPicPr>
+          <p:cNvPr id="10" name="Picture 9"/>
+          <p:cNvPicPr>
+            <a:picLocks noChangeAspect="1"/>
+          </p:cNvPicPr>
+          <p:nvPr/>
+        </p:nvPicPr>
+        <p:blipFill>
+          <a:blip r:embed="rId4"/>
+          <a:stretch>
+            <a:fillRect/>
+          </a:stretch>
+        </p:blipFill>
+        <p:spPr>
+          <a:xfrm>
+            <a:off x="8116357" y="1901501"/>
+            <a:ext cx="3905250" cy="3905250"/>
+          </a:xfrm>
+          <a:prstGeom prst="rect">
+            <a:avLst/>
+          </a:prstGeom>
+        </p:spPr>
+      </p:pic>
+    </p:spTree>
+    <p:extLst>
+      <p:ext uri="{BB962C8B-B14F-4D97-AF65-F5344CB8AC3E}">
+        <p14:creationId xmlns:p14="http://schemas.microsoft.com/office/powerpoint/2010/main" val="2533236408"/>
       </p:ext>
     </p:extLst>
   </p:cSld>
@@ -5540,7 +5836,7 @@
                                           </p:stCondLst>
                                         </p:cTn>
                                         <p:tgtEl>
-                                          <p:spTgt spid="2"/>
+                                          <p:spTgt spid="5"/>
                                         </p:tgtEl>
                                         <p:attrNameLst>
                                           <p:attrName>style.visibility</p:attrName>
@@ -5554,295 +5850,28 @@
                                       <p:cBhvr>
                                         <p:cTn id="7" dur="500"/>
                                         <p:tgtEl>
-                                          <p:spTgt spid="2"/>
+                                          <p:spTgt spid="5"/>
                                         </p:tgtEl>
                                       </p:cBhvr>
                                     </p:animEffect>
                                   </p:childTnLst>
                                 </p:cTn>
                               </p:par>
-                            </p:childTnLst>
-                          </p:cTn>
-                        </p:par>
-                      </p:childTnLst>
-                    </p:cTn>
-                  </p:par>
-                  <p:par>
-                    <p:cTn id="8" fill="hold">
-                      <p:stCondLst>
-                        <p:cond delay="indefinite"/>
-                      </p:stCondLst>
-                      <p:childTnLst>
-                        <p:par>
-                          <p:cTn id="9" fill="hold">
-                            <p:stCondLst>
-                              <p:cond delay="0"/>
-                            </p:stCondLst>
-                            <p:childTnLst>
                               <p:par>
-                                <p:cTn id="10" presetID="1" presetClass="entr" presetSubtype="0" fill="hold" nodeType="clickEffect">
-                                  <p:stCondLst>
-                                    <p:cond delay="0"/>
-                                  </p:stCondLst>
-                                  <p:childTnLst>
-                                    <p:set>
-                                      <p:cBhvr>
-                                        <p:cTn id="11" dur="1" fill="hold">
-                                          <p:stCondLst>
-                                            <p:cond delay="0"/>
-                                          </p:stCondLst>
-                                        </p:cTn>
-                                        <p:tgtEl>
-                                          <p:spTgt spid="4">
-                                            <p:txEl>
-                                              <p:pRg st="0" end="0"/>
-                                            </p:txEl>
-                                          </p:spTgt>
-                                        </p:tgtEl>
-                                        <p:attrNameLst>
-                                          <p:attrName>style.visibility</p:attrName>
-                                        </p:attrNameLst>
-                                      </p:cBhvr>
-                                      <p:to>
-                                        <p:strVal val="visible"/>
-                                      </p:to>
-                                    </p:set>
-                                  </p:childTnLst>
-                                </p:cTn>
-                              </p:par>
-                            </p:childTnLst>
-                          </p:cTn>
-                        </p:par>
-                      </p:childTnLst>
-                    </p:cTn>
-                  </p:par>
-                </p:childTnLst>
-              </p:cTn>
-              <p:prevCondLst>
-                <p:cond evt="onPrev" delay="0">
-                  <p:tgtEl>
-                    <p:sldTgt/>
-                  </p:tgtEl>
-                </p:cond>
-              </p:prevCondLst>
-              <p:nextCondLst>
-                <p:cond evt="onNext" delay="0">
-                  <p:tgtEl>
-                    <p:sldTgt/>
-                  </p:tgtEl>
-                </p:cond>
-              </p:nextCondLst>
-            </p:seq>
-          </p:childTnLst>
-        </p:cTn>
-      </p:par>
-    </p:tnLst>
-    <p:bldLst>
-      <p:bldP spid="2" grpId="0"/>
-    </p:bldLst>
-  </p:timing>
-</p:sld>
-</file>
-
-<file path=ppt/slides/slide14.xml><?xml version="1.0" encoding="utf-8"?>
-<p:sld xmlns:a="http://schemas.openxmlformats.org/drawingml/2006/main" xmlns:r="http://schemas.openxmlformats.org/officeDocument/2006/relationships" xmlns:p="http://schemas.openxmlformats.org/presentationml/2006/main">
-  <p:cSld>
-    <p:spTree>
-      <p:nvGrpSpPr>
-        <p:cNvPr id="1" name=""/>
-        <p:cNvGrpSpPr/>
-        <p:nvPr/>
-      </p:nvGrpSpPr>
-      <p:grpSpPr>
-        <a:xfrm>
-          <a:off x="0" y="0"/>
-          <a:ext cx="0" cy="0"/>
-          <a:chOff x="0" y="0"/>
-          <a:chExt cx="0" cy="0"/>
-        </a:xfrm>
-      </p:grpSpPr>
-      <p:sp>
-        <p:nvSpPr>
-          <p:cNvPr id="3" name="Content Placeholder 2"/>
-          <p:cNvSpPr>
-            <a:spLocks noGrp="1"/>
-          </p:cNvSpPr>
-          <p:nvPr>
-            <p:ph idx="1"/>
-          </p:nvPr>
-        </p:nvSpPr>
-        <p:spPr>
-          <a:xfrm>
-            <a:off x="609600" y="1595672"/>
-            <a:ext cx="9956800" cy="4525963"/>
-          </a:xfrm>
-        </p:spPr>
-        <p:txBody>
-          <a:bodyPr/>
-          <a:lstStyle/>
-          <a:p>
-            <a:pPr lvl="1"/>
-            <a:endParaRPr lang="en-US" dirty="0" smtClean="0"/>
-          </a:p>
-          <a:p>
-            <a:endParaRPr lang="en-US" dirty="0"/>
-          </a:p>
-        </p:txBody>
-      </p:sp>
-      <p:pic>
-        <p:nvPicPr>
-          <p:cNvPr id="4" name="Picture 3"/>
-          <p:cNvPicPr>
-            <a:picLocks noChangeAspect="1"/>
-          </p:cNvPicPr>
-          <p:nvPr/>
-        </p:nvPicPr>
-        <p:blipFill>
-          <a:blip r:embed="rId2"/>
-          <a:stretch>
-            <a:fillRect/>
-          </a:stretch>
-        </p:blipFill>
-        <p:spPr>
-          <a:xfrm>
-            <a:off x="4148137" y="1906029"/>
-            <a:ext cx="3895725" cy="3905250"/>
-          </a:xfrm>
-          <a:prstGeom prst="rect">
-            <a:avLst/>
-          </a:prstGeom>
-        </p:spPr>
-      </p:pic>
-      <p:pic>
-        <p:nvPicPr>
-          <p:cNvPr id="6" name="Picture 5"/>
-          <p:cNvPicPr>
-            <a:picLocks noChangeAspect="1"/>
-          </p:cNvPicPr>
-          <p:nvPr/>
-        </p:nvPicPr>
-        <p:blipFill>
-          <a:blip r:embed="rId3"/>
-          <a:stretch>
-            <a:fillRect/>
-          </a:stretch>
-        </p:blipFill>
-        <p:spPr>
-          <a:xfrm>
-            <a:off x="151341" y="1906029"/>
-            <a:ext cx="3924300" cy="3905250"/>
-          </a:xfrm>
-          <a:prstGeom prst="rect">
-            <a:avLst/>
-          </a:prstGeom>
-        </p:spPr>
-      </p:pic>
-      <p:pic>
-        <p:nvPicPr>
-          <p:cNvPr id="7" name="Picture 6"/>
-          <p:cNvPicPr>
-            <a:picLocks noChangeAspect="1"/>
-          </p:cNvPicPr>
-          <p:nvPr/>
-        </p:nvPicPr>
-        <p:blipFill>
-          <a:blip r:embed="rId4"/>
-          <a:stretch>
-            <a:fillRect/>
-          </a:stretch>
-        </p:blipFill>
-        <p:spPr>
-          <a:xfrm>
-            <a:off x="8116358" y="1906029"/>
-            <a:ext cx="3914775" cy="3905250"/>
-          </a:xfrm>
-          <a:prstGeom prst="rect">
-            <a:avLst/>
-          </a:prstGeom>
-        </p:spPr>
-      </p:pic>
-      <p:sp>
-        <p:nvSpPr>
-          <p:cNvPr id="5" name="Title 4"/>
-          <p:cNvSpPr>
-            <a:spLocks noGrp="1"/>
-          </p:cNvSpPr>
-          <p:nvPr>
-            <p:ph type="title"/>
-          </p:nvPr>
-        </p:nvSpPr>
-        <p:spPr/>
-        <p:txBody>
-          <a:bodyPr/>
-          <a:lstStyle/>
-          <a:p>
-            <a:r>
-              <a:rPr lang="en-US" dirty="0"/>
-              <a:t>Overview - Test Results Reporting</a:t>
-            </a:r>
-          </a:p>
-        </p:txBody>
-      </p:sp>
-    </p:spTree>
-    <p:extLst>
-      <p:ext uri="{BB962C8B-B14F-4D97-AF65-F5344CB8AC3E}">
-        <p14:creationId xmlns:p14="http://schemas.microsoft.com/office/powerpoint/2010/main" val="2533236408"/>
-      </p:ext>
-    </p:extLst>
-  </p:cSld>
-  <p:clrMapOvr>
-    <a:masterClrMapping/>
-  </p:clrMapOvr>
-  <mc:AlternateContent xmlns:mc="http://schemas.openxmlformats.org/markup-compatibility/2006" xmlns:p14="http://schemas.microsoft.com/office/powerpoint/2010/main">
-    <mc:Choice Requires="p14">
-      <p:transition spd="med" p14:dur="700">
-        <p:fade/>
-      </p:transition>
-    </mc:Choice>
-    <mc:Fallback xmlns="">
-      <p:transition spd="med">
-        <p:fade/>
-      </p:transition>
-    </mc:Fallback>
-  </mc:AlternateContent>
-  <p:timing>
-    <p:tnLst>
-      <p:par>
-        <p:cTn id="1" dur="indefinite" restart="never" nodeType="tmRoot">
-          <p:childTnLst>
-            <p:seq concurrent="1" nextAc="seek">
-              <p:cTn id="2" dur="indefinite" nodeType="mainSeq">
-                <p:childTnLst>
-                  <p:par>
-                    <p:cTn id="3" fill="hold">
-                      <p:stCondLst>
-                        <p:cond delay="indefinite"/>
-                        <p:cond evt="onBegin" delay="0">
-                          <p:tn val="2"/>
-                        </p:cond>
-                      </p:stCondLst>
-                      <p:childTnLst>
-                        <p:par>
-                          <p:cTn id="4" fill="hold">
-                            <p:stCondLst>
-                              <p:cond delay="0"/>
-                            </p:stCondLst>
-                            <p:childTnLst>
-                              <p:par>
-                                <p:cTn id="5" presetID="10" presetClass="entr" presetSubtype="0" fill="hold" nodeType="withEffect">
+                                <p:cTn id="8" presetID="10" presetClass="entr" presetSubtype="0" fill="hold" nodeType="withEffect">
                                   <p:stCondLst>
                                     <p:cond delay="1000"/>
                                   </p:stCondLst>
                                   <p:childTnLst>
                                     <p:set>
                                       <p:cBhvr>
-                                        <p:cTn id="6" dur="1" fill="hold">
+                                        <p:cTn id="9" dur="1" fill="hold">
                                           <p:stCondLst>
                                             <p:cond delay="0"/>
                                           </p:stCondLst>
                                         </p:cTn>
                                         <p:tgtEl>
-                                          <p:spTgt spid="6"/>
+                                          <p:spTgt spid="2"/>
                                         </p:tgtEl>
                                         <p:attrNameLst>
                                           <p:attrName>style.visibility</p:attrName>
@@ -5854,44 +5883,9 @@
                                     </p:set>
                                     <p:animEffect transition="in" filter="fade">
                                       <p:cBhvr>
-                                        <p:cTn id="7" dur="500"/>
-                                        <p:tgtEl>
-                                          <p:spTgt spid="6"/>
-                                        </p:tgtEl>
-                                      </p:cBhvr>
-                                    </p:animEffect>
-                                  </p:childTnLst>
-                                </p:cTn>
-                              </p:par>
-                              <p:par>
-                                <p:cTn id="8" presetID="22" presetClass="entr" presetSubtype="8" fill="hold" grpId="0" nodeType="withEffect">
-                                  <p:stCondLst>
-                                    <p:cond delay="0"/>
-                                  </p:stCondLst>
-                                  <p:childTnLst>
-                                    <p:set>
-                                      <p:cBhvr>
-                                        <p:cTn id="9" dur="1" fill="hold">
-                                          <p:stCondLst>
-                                            <p:cond delay="0"/>
-                                          </p:stCondLst>
-                                        </p:cTn>
-                                        <p:tgtEl>
-                                          <p:spTgt spid="5"/>
-                                        </p:tgtEl>
-                                        <p:attrNameLst>
-                                          <p:attrName>style.visibility</p:attrName>
-                                        </p:attrNameLst>
-                                      </p:cBhvr>
-                                      <p:to>
-                                        <p:strVal val="visible"/>
-                                      </p:to>
-                                    </p:set>
-                                    <p:animEffect transition="in" filter="wipe(left)">
-                                      <p:cBhvr>
                                         <p:cTn id="10" dur="500"/>
                                         <p:tgtEl>
-                                          <p:spTgt spid="5"/>
+                                          <p:spTgt spid="2"/>
                                         </p:tgtEl>
                                       </p:cBhvr>
                                     </p:animEffect>
@@ -5930,7 +5924,7 @@
                                           </p:stCondLst>
                                         </p:cTn>
                                         <p:tgtEl>
-                                          <p:spTgt spid="4"/>
+                                          <p:spTgt spid="8"/>
                                         </p:tgtEl>
                                         <p:attrNameLst>
                                           <p:attrName>style.visibility</p:attrName>
@@ -5944,7 +5938,7 @@
                                       <p:cBhvr>
                                         <p:cTn id="15" dur="500"/>
                                         <p:tgtEl>
-                                          <p:spTgt spid="4"/>
+                                          <p:spTgt spid="8"/>
                                         </p:tgtEl>
                                       </p:cBhvr>
                                     </p:animEffect>
@@ -5983,7 +5977,7 @@
                                           </p:stCondLst>
                                         </p:cTn>
                                         <p:tgtEl>
-                                          <p:spTgt spid="7"/>
+                                          <p:spTgt spid="10"/>
                                         </p:tgtEl>
                                         <p:attrNameLst>
                                           <p:attrName>style.visibility</p:attrName>
@@ -5997,7 +5991,7 @@
                                       <p:cBhvr>
                                         <p:cTn id="20" dur="500"/>
                                         <p:tgtEl>
-                                          <p:spTgt spid="7"/>
+                                          <p:spTgt spid="10"/>
                                         </p:tgtEl>
                                       </p:cBhvr>
                                     </p:animEffect>
@@ -6065,11 +6059,17 @@
             <p:ph type="title"/>
           </p:nvPr>
         </p:nvSpPr>
-        <p:spPr/>
+        <p:spPr>
+          <a:xfrm>
+            <a:off x="609600" y="274638"/>
+            <a:ext cx="9956800" cy="6259512"/>
+          </a:xfrm>
+        </p:spPr>
         <p:txBody>
           <a:bodyPr/>
           <a:lstStyle/>
           <a:p>
+            <a:pPr algn="ctr"/>
             <a:r>
               <a:rPr lang="en-US" dirty="0" smtClean="0"/>
               <a:t>Application Demo	</a:t>
@@ -6088,13 +6088,13 @@
   <p:clrMapOvr>
     <a:masterClrMapping/>
   </p:clrMapOvr>
-  <mc:AlternateContent xmlns:mc="http://schemas.openxmlformats.org/markup-compatibility/2006">
-    <mc:Choice xmlns:p14="http://schemas.microsoft.com/office/powerpoint/2010/main" Requires="p14">
+  <mc:AlternateContent xmlns:mc="http://schemas.openxmlformats.org/markup-compatibility/2006" xmlns:p14="http://schemas.microsoft.com/office/powerpoint/2010/main">
+    <mc:Choice Requires="p14">
       <p:transition spd="med" p14:dur="700">
         <p:fade/>
       </p:transition>
     </mc:Choice>
-    <mc:Fallback>
+    <mc:Fallback xmlns="">
       <p:transition spd="med">
         <p:fade/>
       </p:transition>
@@ -6143,12 +6143,8 @@
           <a:lstStyle/>
           <a:p>
             <a:r>
-              <a:rPr lang="en-US" sz="4000" dirty="0"/>
-              <a:t>Knowledge </a:t>
-            </a:r>
-            <a:r>
               <a:rPr lang="en-US" sz="4000" dirty="0" smtClean="0"/>
-              <a:t>Sharing</a:t>
+              <a:t>Knowledge Sharing</a:t>
             </a:r>
             <a:endParaRPr lang="en-US" sz="4000" dirty="0" smtClean="0"/>
           </a:p>
@@ -6157,7 +6153,6 @@
               <a:rPr lang="en-US" sz="4000" dirty="0" smtClean="0"/>
               <a:t>Work Flow Interruption</a:t>
             </a:r>
-            <a:endParaRPr lang="en-US" sz="4000" dirty="0" smtClean="0"/>
           </a:p>
           <a:p>
             <a:r>
@@ -6198,11 +6193,7 @@
           <a:p>
             <a:r>
               <a:rPr lang="en-US" dirty="0" smtClean="0"/>
-              <a:t>Lessons </a:t>
-            </a:r>
-            <a:r>
-              <a:rPr lang="en-US" dirty="0" smtClean="0"/>
-              <a:t>Learned</a:t>
+              <a:t>Lessons Learned</a:t>
             </a:r>
             <a:endParaRPr lang="en-US" dirty="0"/>
           </a:p>
@@ -6279,7 +6270,7 @@
                                     </p:set>
                                     <p:animEffect transition="in" filter="wipe(left)">
                                       <p:cBhvr>
-                                        <p:cTn id="7" dur="500"/>
+                                        <p:cTn id="7" dur="1000"/>
                                         <p:tgtEl>
                                           <p:spTgt spid="2"/>
                                         </p:tgtEl>
@@ -6288,33 +6279,15 @@
                                   </p:childTnLst>
                                 </p:cTn>
                               </p:par>
-                            </p:childTnLst>
-                          </p:cTn>
-                        </p:par>
-                      </p:childTnLst>
-                    </p:cTn>
-                  </p:par>
-                  <p:par>
-                    <p:cTn id="8" fill="hold">
-                      <p:stCondLst>
-                        <p:cond delay="indefinite"/>
-                      </p:stCondLst>
-                      <p:childTnLst>
-                        <p:par>
-                          <p:cTn id="9" fill="hold">
-                            <p:stCondLst>
-                              <p:cond delay="0"/>
-                            </p:stCondLst>
-                            <p:childTnLst>
                               <p:par>
-                                <p:cTn id="10" presetID="1" presetClass="entr" presetSubtype="0" fill="hold" nodeType="clickEffect">
+                                <p:cTn id="8" presetID="1" presetClass="entr" presetSubtype="0" fill="hold" nodeType="withEffect">
                                   <p:stCondLst>
-                                    <p:cond delay="0"/>
+                                    <p:cond delay="1000"/>
                                   </p:stCondLst>
                                   <p:childTnLst>
                                     <p:set>
                                       <p:cBhvr>
-                                        <p:cTn id="11" dur="1" fill="hold">
+                                        <p:cTn id="9" dur="1" fill="hold">
                                           <p:stCondLst>
                                             <p:cond delay="0"/>
                                           </p:stCondLst>
@@ -6344,26 +6317,26 @@
                     </p:cTn>
                   </p:par>
                   <p:par>
-                    <p:cTn id="12" fill="hold">
+                    <p:cTn id="10" fill="hold">
                       <p:stCondLst>
                         <p:cond delay="indefinite"/>
                       </p:stCondLst>
                       <p:childTnLst>
                         <p:par>
-                          <p:cTn id="13" fill="hold">
+                          <p:cTn id="11" fill="hold">
                             <p:stCondLst>
                               <p:cond delay="0"/>
                             </p:stCondLst>
                             <p:childTnLst>
                               <p:par>
-                                <p:cTn id="14" presetID="1" presetClass="entr" presetSubtype="0" fill="hold" nodeType="clickEffect">
+                                <p:cTn id="12" presetID="1" presetClass="entr" presetSubtype="0" fill="hold" nodeType="clickEffect">
                                   <p:stCondLst>
                                     <p:cond delay="0"/>
                                   </p:stCondLst>
                                   <p:childTnLst>
                                     <p:set>
                                       <p:cBhvr>
-                                        <p:cTn id="15" dur="1" fill="hold">
+                                        <p:cTn id="13" dur="1" fill="hold">
                                           <p:stCondLst>
                                             <p:cond delay="0"/>
                                           </p:stCondLst>
@@ -6393,26 +6366,26 @@
                     </p:cTn>
                   </p:par>
                   <p:par>
-                    <p:cTn id="16" fill="hold">
+                    <p:cTn id="14" fill="hold">
                       <p:stCondLst>
                         <p:cond delay="indefinite"/>
                       </p:stCondLst>
                       <p:childTnLst>
                         <p:par>
-                          <p:cTn id="17" fill="hold">
+                          <p:cTn id="15" fill="hold">
                             <p:stCondLst>
                               <p:cond delay="0"/>
                             </p:stCondLst>
                             <p:childTnLst>
                               <p:par>
-                                <p:cTn id="18" presetID="1" presetClass="entr" presetSubtype="0" fill="hold" nodeType="clickEffect">
+                                <p:cTn id="16" presetID="1" presetClass="entr" presetSubtype="0" fill="hold" nodeType="clickEffect">
                                   <p:stCondLst>
                                     <p:cond delay="0"/>
                                   </p:stCondLst>
                                   <p:childTnLst>
                                     <p:set>
                                       <p:cBhvr>
-                                        <p:cTn id="19" dur="1" fill="hold">
+                                        <p:cTn id="17" dur="1" fill="hold">
                                           <p:stCondLst>
                                             <p:cond delay="0"/>
                                           </p:stCondLst>
@@ -6442,26 +6415,26 @@
                     </p:cTn>
                   </p:par>
                   <p:par>
-                    <p:cTn id="20" fill="hold">
+                    <p:cTn id="18" fill="hold">
                       <p:stCondLst>
                         <p:cond delay="indefinite"/>
                       </p:stCondLst>
                       <p:childTnLst>
                         <p:par>
-                          <p:cTn id="21" fill="hold">
+                          <p:cTn id="19" fill="hold">
                             <p:stCondLst>
                               <p:cond delay="0"/>
                             </p:stCondLst>
                             <p:childTnLst>
                               <p:par>
-                                <p:cTn id="22" presetID="1" presetClass="entr" presetSubtype="0" fill="hold" nodeType="clickEffect">
+                                <p:cTn id="20" presetID="1" presetClass="entr" presetSubtype="0" fill="hold" nodeType="clickEffect">
                                   <p:stCondLst>
                                     <p:cond delay="0"/>
                                   </p:stCondLst>
                                   <p:childTnLst>
                                     <p:set>
                                       <p:cBhvr>
-                                        <p:cTn id="23" dur="1" fill="hold">
+                                        <p:cTn id="21" dur="1" fill="hold">
                                           <p:stCondLst>
                                             <p:cond delay="0"/>
                                           </p:stCondLst>
@@ -7024,18 +6997,14 @@
           <a:p>
             <a:r>
               <a:rPr lang="en-US" sz="4000" dirty="0" smtClean="0"/>
-              <a:t>Application Demo</a:t>
+              <a:t>Demo</a:t>
             </a:r>
             <a:endParaRPr lang="en-US" sz="4000" dirty="0" smtClean="0"/>
           </a:p>
           <a:p>
             <a:r>
               <a:rPr lang="en-US" sz="4000" dirty="0" smtClean="0"/>
-              <a:t>Lessons </a:t>
-            </a:r>
-            <a:r>
-              <a:rPr lang="en-US" sz="4000" dirty="0" smtClean="0"/>
-              <a:t>Learned</a:t>
+              <a:t>Lessons Learned</a:t>
             </a:r>
           </a:p>
           <a:p>
@@ -7137,7 +7106,7 @@
                                     </p:set>
                                     <p:animEffect transition="in" filter="wipe(left)">
                                       <p:cBhvr>
-                                        <p:cTn id="7" dur="500"/>
+                                        <p:cTn id="7" dur="1000"/>
                                         <p:tgtEl>
                                           <p:spTgt spid="2"/>
                                         </p:tgtEl>
@@ -7656,7 +7625,7 @@
                                     </p:set>
                                     <p:animEffect transition="in" filter="wipe(left)">
                                       <p:cBhvr>
-                                        <p:cTn id="7" dur="500"/>
+                                        <p:cTn id="7" dur="1000"/>
                                         <p:tgtEl>
                                           <p:spTgt spid="2"/>
                                         </p:tgtEl>
@@ -8175,7 +8144,7 @@
                                     </p:set>
                                     <p:animEffect transition="in" filter="wipe(left)">
                                       <p:cBhvr>
-                                        <p:cTn id="7" dur="500"/>
+                                        <p:cTn id="7" dur="1000"/>
                                         <p:tgtEl>
                                           <p:spTgt spid="2"/>
                                         </p:tgtEl>
@@ -8187,7 +8156,7 @@
                               <p:par>
                                 <p:cTn id="8" presetID="1" presetClass="entr" presetSubtype="0" fill="hold" nodeType="withEffect">
                                   <p:stCondLst>
-                                    <p:cond delay="0"/>
+                                    <p:cond delay="500"/>
                                   </p:stCondLst>
                                   <p:childTnLst>
                                     <p:set>
@@ -8886,8 +8855,8 @@
         </p:blipFill>
         <p:spPr>
           <a:xfrm>
-            <a:off x="2669969" y="2281254"/>
-            <a:ext cx="5805291" cy="2726133"/>
+            <a:off x="3250995" y="2500330"/>
+            <a:ext cx="4959556" cy="2328980"/>
           </a:xfrm>
           <a:prstGeom prst="rect">
             <a:avLst/>
@@ -9108,29 +9077,6 @@
       </p:grpSpPr>
       <p:sp>
         <p:nvSpPr>
-          <p:cNvPr id="3" name="Content Placeholder 2"/>
-          <p:cNvSpPr>
-            <a:spLocks noGrp="1"/>
-          </p:cNvSpPr>
-          <p:nvPr>
-            <p:ph idx="1"/>
-          </p:nvPr>
-        </p:nvSpPr>
-        <p:spPr/>
-        <p:txBody>
-          <a:bodyPr/>
-          <a:lstStyle/>
-          <a:p>
-            <a:pPr lvl="1"/>
-            <a:endParaRPr lang="en-US" dirty="0" smtClean="0"/>
-          </a:p>
-          <a:p>
-            <a:endParaRPr lang="en-US" dirty="0"/>
-          </a:p>
-        </p:txBody>
-      </p:sp>
-      <p:sp>
-        <p:nvSpPr>
           <p:cNvPr id="2" name="Title 1"/>
           <p:cNvSpPr>
             <a:spLocks noGrp="1"/>
@@ -9146,11 +9092,7 @@
           <a:p>
             <a:r>
               <a:rPr lang="en-US" dirty="0" smtClean="0"/>
-              <a:t>Overview </a:t>
-            </a:r>
-            <a:r>
-              <a:rPr lang="en-US" dirty="0" smtClean="0"/>
-              <a:t>– Registration Screen</a:t>
+              <a:t>Overview – Registration Screen</a:t>
             </a:r>
             <a:endParaRPr lang="en-US" dirty="0"/>
           </a:p>
@@ -9158,7 +9100,7 @@
       </p:sp>
       <p:pic>
         <p:nvPicPr>
-          <p:cNvPr id="4" name="Picture 3"/>
+          <p:cNvPr id="5" name="Picture 4"/>
           <p:cNvPicPr>
             <a:picLocks noChangeAspect="1"/>
           </p:cNvPicPr>
@@ -9172,8 +9114,8 @@
         </p:blipFill>
         <p:spPr>
           <a:xfrm>
-            <a:off x="2669969" y="2281254"/>
-            <a:ext cx="5805291" cy="2726133"/>
+            <a:off x="3114676" y="1417638"/>
+            <a:ext cx="5276849" cy="4880259"/>
           </a:xfrm>
           <a:prstGeom prst="rect">
             <a:avLst/>
@@ -9251,7 +9193,7 @@
                                     </p:set>
                                     <p:animEffect transition="in" filter="wipe(left)">
                                       <p:cBhvr>
-                                        <p:cTn id="7" dur="500"/>
+                                        <p:cTn id="7" dur="1000"/>
                                         <p:tgtEl>
                                           <p:spTgt spid="2"/>
                                         </p:tgtEl>
@@ -9261,7 +9203,7 @@
                                 </p:cTn>
                               </p:par>
                               <p:par>
-                                <p:cTn id="8" presetID="53" presetClass="entr" presetSubtype="16" fill="hold" nodeType="withEffect">
+                                <p:cTn id="8" presetID="10" presetClass="entr" presetSubtype="0" fill="hold" nodeType="withEffect">
                                   <p:stCondLst>
                                     <p:cond delay="1000"/>
                                   </p:stCondLst>
@@ -9274,7 +9216,7 @@
                                           </p:stCondLst>
                                         </p:cTn>
                                         <p:tgtEl>
-                                          <p:spTgt spid="4"/>
+                                          <p:spTgt spid="5"/>
                                         </p:tgtEl>
                                         <p:attrNameLst>
                                           <p:attrName>style.visibility</p:attrName>
@@ -9284,57 +9226,11 @@
                                         <p:strVal val="visible"/>
                                       </p:to>
                                     </p:set>
-                                    <p:anim calcmode="lin" valueType="num">
-                                      <p:cBhvr>
-                                        <p:cTn id="10" dur="10" fill="hold"/>
-                                        <p:tgtEl>
-                                          <p:spTgt spid="4"/>
-                                        </p:tgtEl>
-                                        <p:attrNameLst>
-                                          <p:attrName>ppt_w</p:attrName>
-                                        </p:attrNameLst>
-                                      </p:cBhvr>
-                                      <p:tavLst>
-                                        <p:tav tm="0">
-                                          <p:val>
-                                            <p:fltVal val="0"/>
-                                          </p:val>
-                                        </p:tav>
-                                        <p:tav tm="100000">
-                                          <p:val>
-                                            <p:strVal val="#ppt_w"/>
-                                          </p:val>
-                                        </p:tav>
-                                      </p:tavLst>
-                                    </p:anim>
-                                    <p:anim calcmode="lin" valueType="num">
-                                      <p:cBhvr>
-                                        <p:cTn id="11" dur="10" fill="hold"/>
-                                        <p:tgtEl>
-                                          <p:spTgt spid="4"/>
-                                        </p:tgtEl>
-                                        <p:attrNameLst>
-                                          <p:attrName>ppt_h</p:attrName>
-                                        </p:attrNameLst>
-                                      </p:cBhvr>
-                                      <p:tavLst>
-                                        <p:tav tm="0">
-                                          <p:val>
-                                            <p:fltVal val="0"/>
-                                          </p:val>
-                                        </p:tav>
-                                        <p:tav tm="100000">
-                                          <p:val>
-                                            <p:strVal val="#ppt_h"/>
-                                          </p:val>
-                                        </p:tav>
-                                      </p:tavLst>
-                                    </p:anim>
                                     <p:animEffect transition="in" filter="fade">
                                       <p:cBhvr>
-                                        <p:cTn id="12" dur="10"/>
+                                        <p:cTn id="10" dur="500"/>
                                         <p:tgtEl>
-                                          <p:spTgt spid="4"/>
+                                          <p:spTgt spid="5"/>
                                         </p:tgtEl>
                                       </p:cBhvr>
                                     </p:animEffect>

</xml_diff>

<commit_message>
updated presentation and JAR
</commit_message>
<xml_diff>
--- a/assigns/assign10/t1-a10.pptx
+++ b/assigns/assign10/t1-a10.pptx
@@ -245,7 +245,7 @@
           <a:p>
             <a:fld id="{85B84C55-34AB-4F04-8C6E-103378987567}" type="datetimeFigureOut">
               <a:rPr lang="en-US" smtClean="0"/>
-              <a:t>6/7/2015</a:t>
+              <a:t>6/8/2015</a:t>
             </a:fld>
             <a:endParaRPr lang="en-US" dirty="0"/>
           </a:p>
@@ -410,7 +410,7 @@
           <a:p>
             <a:fld id="{86832DD9-7C6A-4C91-8CF1-0788B8213502}" type="datetimeFigureOut">
               <a:rPr lang="en-US" smtClean="0"/>
-              <a:t>6/7/2015</a:t>
+              <a:t>6/8/2015</a:t>
             </a:fld>
             <a:endParaRPr lang="en-US" dirty="0"/>
           </a:p>
@@ -796,7 +796,7 @@
           <a:p>
             <a:fld id="{8A57DA2E-A198-42B8-A77A-6063A9DC8646}" type="datetime1">
               <a:rPr lang="en-US" smtClean="0"/>
-              <a:t>6/7/2015</a:t>
+              <a:t>6/8/2015</a:t>
             </a:fld>
             <a:endParaRPr lang="en-US" dirty="0"/>
           </a:p>
@@ -1211,7 +1211,7 @@
           <a:p>
             <a:fld id="{5D0B467C-85F7-469C-B16D-CF41F04F5F22}" type="datetime1">
               <a:rPr lang="en-US" smtClean="0"/>
-              <a:t>6/7/2015</a:t>
+              <a:t>6/8/2015</a:t>
             </a:fld>
             <a:endParaRPr lang="en-US" dirty="0"/>
           </a:p>
@@ -1393,7 +1393,7 @@
           <a:p>
             <a:fld id="{38E79436-BD82-44D9-9B6F-6D45FC4FB282}" type="datetime1">
               <a:rPr lang="en-US" smtClean="0"/>
-              <a:t>6/7/2015</a:t>
+              <a:t>6/8/2015</a:t>
             </a:fld>
             <a:endParaRPr lang="en-US" dirty="0"/>
           </a:p>
@@ -1585,7 +1585,7 @@
           <a:p>
             <a:fld id="{6955B0D3-E9C4-4790-9AFC-472238E9D978}" type="datetime1">
               <a:rPr lang="en-US" smtClean="0"/>
-              <a:t>6/7/2015</a:t>
+              <a:t>6/8/2015</a:t>
             </a:fld>
             <a:endParaRPr lang="en-US" dirty="0"/>
           </a:p>
@@ -1771,7 +1771,7 @@
           <a:p>
             <a:fld id="{A9EFB39F-05CF-4198-9763-0EA4BE92E0D0}" type="datetime1">
               <a:rPr lang="en-US" smtClean="0"/>
-              <a:t>6/7/2015</a:t>
+              <a:t>6/8/2015</a:t>
             </a:fld>
             <a:endParaRPr lang="en-US" dirty="0"/>
           </a:p>
@@ -2008,7 +2008,7 @@
           <a:p>
             <a:fld id="{FF2491D0-1B86-4F30-8D90-913BBBB0A4F2}" type="datetime1">
               <a:rPr lang="en-US" smtClean="0"/>
-              <a:t>6/7/2015</a:t>
+              <a:t>6/8/2015</a:t>
             </a:fld>
             <a:endParaRPr lang="en-US" dirty="0"/>
           </a:p>
@@ -2289,7 +2289,7 @@
           <a:p>
             <a:fld id="{A28FD5D4-22BE-49CA-89DE-DEB7778B4EA0}" type="datetime1">
               <a:rPr lang="en-US" smtClean="0"/>
-              <a:t>6/7/2015</a:t>
+              <a:t>6/8/2015</a:t>
             </a:fld>
             <a:endParaRPr lang="en-US" dirty="0"/>
           </a:p>
@@ -2680,7 +2680,7 @@
           <a:p>
             <a:fld id="{98A942CB-856E-4E4B-8C89-197AEAE66A5F}" type="datetime1">
               <a:rPr lang="en-US" smtClean="0"/>
-              <a:t>6/7/2015</a:t>
+              <a:t>6/8/2015</a:t>
             </a:fld>
             <a:endParaRPr lang="en-US" dirty="0"/>
           </a:p>
@@ -2819,7 +2819,7 @@
           <a:p>
             <a:fld id="{90C5A565-20AE-4CD1-A4DD-E062216372E9}" type="datetime1">
               <a:rPr lang="en-US" smtClean="0"/>
-              <a:t>6/7/2015</a:t>
+              <a:t>6/8/2015</a:t>
             </a:fld>
             <a:endParaRPr lang="en-US" dirty="0"/>
           </a:p>
@@ -2999,7 +2999,7 @@
           <a:p>
             <a:fld id="{43669077-B497-459B-927D-21898BE78E1B}" type="datetime1">
               <a:rPr lang="en-US" smtClean="0"/>
-              <a:t>6/7/2015</a:t>
+              <a:t>6/8/2015</a:t>
             </a:fld>
             <a:endParaRPr lang="en-US" dirty="0"/>
           </a:p>
@@ -3270,7 +3270,7 @@
           <a:p>
             <a:fld id="{E5371151-446F-4595-B3D3-21EF3A6E9BFE}" type="datetime1">
               <a:rPr lang="en-US" smtClean="0"/>
-              <a:t>6/7/2015</a:t>
+              <a:t>6/8/2015</a:t>
             </a:fld>
             <a:endParaRPr lang="en-US" dirty="0"/>
           </a:p>
@@ -3585,7 +3585,7 @@
           <a:p>
             <a:fld id="{671E04DB-BE65-47F8-B877-7DBE6DFA71B8}" type="datetime1">
               <a:rPr lang="en-US" smtClean="0"/>
-              <a:t>6/7/2015</a:t>
+              <a:t>6/8/2015</a:t>
             </a:fld>
             <a:endParaRPr lang="en-US" dirty="0"/>
           </a:p>
@@ -5382,15 +5382,7 @@
               <a:rPr lang="en-US" sz="4000" dirty="0" smtClean="0"/>
               <a:t>Results</a:t>
             </a:r>
-          </a:p>
-          <a:p>
-            <a:r>
-              <a:rPr lang="en-US" sz="4000" dirty="0"/>
-              <a:t>View Progress Meter During the User Test</a:t>
-            </a:r>
-          </a:p>
-          <a:p>
-            <a:endParaRPr lang="en-US" sz="4000" dirty="0"/>
+            <a:endParaRPr lang="en-US" sz="4000" dirty="0" smtClean="0"/>
           </a:p>
         </p:txBody>
       </p:sp>
@@ -5540,55 +5532,6 @@
                                           <p:spTgt spid="4">
                                             <p:txEl>
                                               <p:pRg st="1" end="1"/>
-                                            </p:txEl>
-                                          </p:spTgt>
-                                        </p:tgtEl>
-                                        <p:attrNameLst>
-                                          <p:attrName>style.visibility</p:attrName>
-                                        </p:attrNameLst>
-                                      </p:cBhvr>
-                                      <p:to>
-                                        <p:strVal val="visible"/>
-                                      </p:to>
-                                    </p:set>
-                                  </p:childTnLst>
-                                </p:cTn>
-                              </p:par>
-                            </p:childTnLst>
-                          </p:cTn>
-                        </p:par>
-                      </p:childTnLst>
-                    </p:cTn>
-                  </p:par>
-                  <p:par>
-                    <p:cTn id="14" fill="hold">
-                      <p:stCondLst>
-                        <p:cond delay="indefinite"/>
-                      </p:stCondLst>
-                      <p:childTnLst>
-                        <p:par>
-                          <p:cTn id="15" fill="hold">
-                            <p:stCondLst>
-                              <p:cond delay="0"/>
-                            </p:stCondLst>
-                            <p:childTnLst>
-                              <p:par>
-                                <p:cTn id="16" presetID="1" presetClass="entr" presetSubtype="0" fill="hold" grpId="0" nodeType="clickEffect">
-                                  <p:stCondLst>
-                                    <p:cond delay="0"/>
-                                  </p:stCondLst>
-                                  <p:childTnLst>
-                                    <p:set>
-                                      <p:cBhvr>
-                                        <p:cTn id="17" dur="1" fill="hold">
-                                          <p:stCondLst>
-                                            <p:cond delay="0"/>
-                                          </p:stCondLst>
-                                        </p:cTn>
-                                        <p:tgtEl>
-                                          <p:spTgt spid="4">
-                                            <p:txEl>
-                                              <p:pRg st="2" end="2"/>
                                             </p:txEl>
                                           </p:spTgt>
                                         </p:tgtEl>
@@ -6146,7 +6089,6 @@
               <a:rPr lang="en-US" sz="4000" dirty="0" smtClean="0"/>
               <a:t>Knowledge Sharing</a:t>
             </a:r>
-            <a:endParaRPr lang="en-US" sz="4000" dirty="0" smtClean="0"/>
           </a:p>
           <a:p>
             <a:r>
@@ -6999,7 +6941,6 @@
               <a:rPr lang="en-US" sz="4000" dirty="0" smtClean="0"/>
               <a:t>Demo</a:t>
             </a:r>
-            <a:endParaRPr lang="en-US" sz="4000" dirty="0" smtClean="0"/>
           </a:p>
           <a:p>
             <a:r>

</xml_diff>